<commit_message>
updated design of slides
</commit_message>
<xml_diff>
--- a/Daily/sprint9/Final_Presentation_Phase_I.pptx
+++ b/Daily/sprint9/Final_Presentation_Phase_I.pptx
@@ -1174,7 +1174,7 @@
           <a:p>
             <a:fld id="{9CDC8AA7-8D38-46C0-86D3-87BDB8133F92}" type="datetimeFigureOut">
               <a:rPr lang="de-DE" smtClean="0"/>
-              <a:t>08.07.2020</a:t>
+              <a:t>10.07.2020</a:t>
             </a:fld>
             <a:endParaRPr lang="de-DE"/>
           </a:p>
@@ -3244,6 +3244,132 @@
               <a:buChar char="-"/>
             </a:pPr>
             <a:r>
+              <a:rPr lang="de-DE" dirty="0" err="1"/>
+              <a:t>Actual</a:t>
+            </a:r>
+            <a:r>
+              <a:rPr lang="de-DE" dirty="0"/>
+              <a:t> </a:t>
+            </a:r>
+            <a:r>
+              <a:rPr lang="de-DE" dirty="0" err="1"/>
+              <a:t>outcome</a:t>
+            </a:r>
+            <a:r>
+              <a:rPr lang="de-DE" dirty="0"/>
+              <a:t> </a:t>
+            </a:r>
+            <a:r>
+              <a:rPr lang="de-DE" dirty="0" err="1"/>
+              <a:t>is</a:t>
+            </a:r>
+            <a:r>
+              <a:rPr lang="de-DE" dirty="0"/>
+              <a:t> not </a:t>
+            </a:r>
+            <a:r>
+              <a:rPr lang="de-DE" dirty="0" err="1"/>
+              <a:t>bad</a:t>
+            </a:r>
+            <a:r>
+              <a:rPr lang="de-DE" dirty="0"/>
+              <a:t>, </a:t>
+            </a:r>
+            <a:r>
+              <a:rPr lang="de-DE" dirty="0" err="1"/>
+              <a:t>instead</a:t>
+            </a:r>
+            <a:r>
+              <a:rPr lang="de-DE" dirty="0"/>
+              <a:t> </a:t>
+            </a:r>
+            <a:r>
+              <a:rPr lang="de-DE" dirty="0" err="1"/>
+              <a:t>its</a:t>
+            </a:r>
+            <a:r>
+              <a:rPr lang="de-DE" dirty="0"/>
+              <a:t> </a:t>
+            </a:r>
+            <a:r>
+              <a:rPr lang="de-DE" dirty="0" err="1"/>
+              <a:t>pretty</a:t>
+            </a:r>
+            <a:r>
+              <a:rPr lang="de-DE" dirty="0"/>
+              <a:t> </a:t>
+            </a:r>
+            <a:r>
+              <a:rPr lang="de-DE" dirty="0" err="1"/>
+              <a:t>good</a:t>
+            </a:r>
+            <a:r>
+              <a:rPr lang="de-DE" dirty="0"/>
+              <a:t>. (As </a:t>
+            </a:r>
+            <a:r>
+              <a:rPr lang="de-DE" dirty="0" err="1"/>
+              <a:t>always</a:t>
+            </a:r>
+            <a:r>
+              <a:rPr lang="de-DE" dirty="0"/>
+              <a:t>, at </a:t>
+            </a:r>
+            <a:r>
+              <a:rPr lang="de-DE" dirty="0" err="1"/>
+              <a:t>the</a:t>
+            </a:r>
+            <a:r>
+              <a:rPr lang="de-DE" dirty="0"/>
+              <a:t> end </a:t>
+            </a:r>
+            <a:r>
+              <a:rPr lang="de-DE" dirty="0" err="1"/>
+              <a:t>the</a:t>
+            </a:r>
+            <a:r>
+              <a:rPr lang="de-DE" dirty="0"/>
+              <a:t> </a:t>
+            </a:r>
+            <a:r>
+              <a:rPr lang="de-DE" dirty="0" err="1"/>
+              <a:t>learning</a:t>
+            </a:r>
+            <a:r>
+              <a:rPr lang="de-DE" dirty="0"/>
+              <a:t> </a:t>
+            </a:r>
+            <a:r>
+              <a:rPr lang="de-DE" dirty="0" err="1"/>
+              <a:t>ratio</a:t>
+            </a:r>
+            <a:r>
+              <a:rPr lang="de-DE" dirty="0"/>
+              <a:t> </a:t>
+            </a:r>
+            <a:r>
+              <a:rPr lang="de-DE" dirty="0" err="1"/>
+              <a:t>increases</a:t>
+            </a:r>
+            <a:r>
+              <a:rPr lang="de-DE" dirty="0"/>
+              <a:t> </a:t>
+            </a:r>
+            <a:r>
+              <a:rPr lang="de-DE" dirty="0" err="1"/>
+              <a:t>trememdously</a:t>
+            </a:r>
+            <a:r>
+              <a:rPr lang="de-DE" dirty="0"/>
+              <a:t>)</a:t>
+            </a:r>
+          </a:p>
+          <a:p>
+            <a:pPr marL="171450" indent="-171450">
+              <a:buFontTx/>
+              <a:buChar char="-"/>
+            </a:pPr>
+            <a:r>
               <a:rPr lang="de-DE" dirty="0"/>
               <a:t>SOME OF US </a:t>
             </a:r>
@@ -4261,7 +4387,7 @@
           <a:p>
             <a:fld id="{7ABF9344-E2D6-41B8-8336-B38128CBBEFE}" type="datetime1">
               <a:rPr lang="de-DE" smtClean="0"/>
-              <a:t>08.07.2020</a:t>
+              <a:t>10.07.2020</a:t>
             </a:fld>
             <a:endParaRPr lang="de-DE" dirty="0"/>
           </a:p>
@@ -4471,7 +4597,7 @@
           <a:p>
             <a:fld id="{92D88334-638A-4E37-A722-9BFF55B4E2BD}" type="datetime1">
               <a:rPr lang="de-DE" smtClean="0"/>
-              <a:t>08.07.2020</a:t>
+              <a:t>10.07.2020</a:t>
             </a:fld>
             <a:endParaRPr lang="de-DE"/>
           </a:p>
@@ -4690,7 +4816,7 @@
           <a:p>
             <a:fld id="{A307E243-58B9-4062-B4DD-2FC86F3FE2CE}" type="datetime1">
               <a:rPr lang="de-DE" smtClean="0"/>
-              <a:t>08.07.2020</a:t>
+              <a:t>10.07.2020</a:t>
             </a:fld>
             <a:endParaRPr lang="de-DE"/>
           </a:p>
@@ -4899,7 +5025,7 @@
           <a:p>
             <a:fld id="{D3B4A22E-EFB2-4269-B19E-F96688142D44}" type="datetime1">
               <a:rPr lang="de-DE" smtClean="0"/>
-              <a:t>08.07.2020</a:t>
+              <a:t>10.07.2020</a:t>
             </a:fld>
             <a:endParaRPr lang="de-DE"/>
           </a:p>
@@ -5185,7 +5311,7 @@
           <a:p>
             <a:fld id="{E57F6921-F63E-4D78-B944-128566970DF6}" type="datetime1">
               <a:rPr lang="de-DE" smtClean="0"/>
-              <a:t>08.07.2020</a:t>
+              <a:t>10.07.2020</a:t>
             </a:fld>
             <a:endParaRPr lang="de-DE"/>
           </a:p>
@@ -5461,7 +5587,7 @@
           <a:p>
             <a:fld id="{53F7DFF1-5CF9-4DD8-B5A5-322A26530AEA}" type="datetime1">
               <a:rPr lang="de-DE" smtClean="0"/>
-              <a:t>08.07.2020</a:t>
+              <a:t>10.07.2020</a:t>
             </a:fld>
             <a:endParaRPr lang="de-DE"/>
           </a:p>
@@ -5884,7 +6010,7 @@
           <a:p>
             <a:fld id="{B4AC1EFC-A134-49D1-A96F-8F166B05C93E}" type="datetime1">
               <a:rPr lang="de-DE" smtClean="0"/>
-              <a:t>08.07.2020</a:t>
+              <a:t>10.07.2020</a:t>
             </a:fld>
             <a:endParaRPr lang="de-DE"/>
           </a:p>
@@ -6036,7 +6162,7 @@
           <a:p>
             <a:fld id="{4268A0E3-80E2-4119-B122-D6E1EA8E4290}" type="datetime1">
               <a:rPr lang="de-DE" smtClean="0"/>
-              <a:t>08.07.2020</a:t>
+              <a:t>10.07.2020</a:t>
             </a:fld>
             <a:endParaRPr lang="de-DE"/>
           </a:p>
@@ -6160,7 +6286,7 @@
           <a:p>
             <a:fld id="{12689309-06AD-42C7-B6C4-9C57374B3903}" type="datetime1">
               <a:rPr lang="de-DE" smtClean="0"/>
-              <a:t>08.07.2020</a:t>
+              <a:t>10.07.2020</a:t>
             </a:fld>
             <a:endParaRPr lang="de-DE"/>
           </a:p>
@@ -6482,7 +6608,7 @@
           <a:p>
             <a:fld id="{88D297F6-F1B5-474E-9B8C-816C396AE099}" type="datetime1">
               <a:rPr lang="de-DE" smtClean="0"/>
-              <a:t>08.07.2020</a:t>
+              <a:t>10.07.2020</a:t>
             </a:fld>
             <a:endParaRPr lang="de-DE"/>
           </a:p>
@@ -6781,7 +6907,7 @@
           <a:p>
             <a:fld id="{F529DD80-3AD9-468C-8F3F-44249342E2F9}" type="datetime1">
               <a:rPr lang="de-DE" smtClean="0"/>
-              <a:t>08.07.2020</a:t>
+              <a:t>10.07.2020</a:t>
             </a:fld>
             <a:endParaRPr lang="de-DE"/>
           </a:p>
@@ -7033,7 +7159,7 @@
           <a:p>
             <a:fld id="{B2EB379E-BA81-4797-9D73-594FFC8C1978}" type="datetime1">
               <a:rPr lang="de-DE" smtClean="0"/>
-              <a:t>08.07.2020</a:t>
+              <a:t>10.07.2020</a:t>
             </a:fld>
             <a:endParaRPr lang="de-DE" dirty="0"/>
           </a:p>
@@ -7749,7 +7875,7 @@
           <a:p>
             <a:fld id="{05D2F1A8-5FA3-4E43-8092-4BFF3A2D9E3F}" type="datetime1">
               <a:rPr lang="de-DE" smtClean="0"/>
-              <a:t>08.07.2020</a:t>
+              <a:t>10.07.2020</a:t>
             </a:fld>
             <a:endParaRPr lang="de-DE"/>
           </a:p>
@@ -7939,7 +8065,7 @@
           <a:p>
             <a:fld id="{D3E6BCF9-FF11-4254-BA36-227E050BFDE9}" type="datetime1">
               <a:rPr lang="de-DE" smtClean="0"/>
-              <a:t>08.07.2020</a:t>
+              <a:t>10.07.2020</a:t>
             </a:fld>
             <a:endParaRPr lang="de-DE"/>
           </a:p>
@@ -8023,12 +8149,30 @@
           <a:bodyPr/>
           <a:lstStyle/>
           <a:p>
+            <a:pPr marL="285750" indent="-285750">
+              <a:buClr>
+                <a:schemeClr val="accent1">
+                  <a:lumMod val="75000"/>
+                </a:schemeClr>
+              </a:buClr>
+              <a:buFont typeface="Arial" panose="020B0604020202020204" pitchFamily="34" charset="0"/>
+              <a:buChar char="▌"/>
+            </a:pPr>
             <a:r>
               <a:rPr lang="en-US" dirty="0"/>
               <a:t>Normalization – old and new better way</a:t>
             </a:r>
           </a:p>
           <a:p>
+            <a:pPr marL="285750" indent="-285750">
+              <a:buClr>
+                <a:schemeClr val="accent1">
+                  <a:lumMod val="75000"/>
+                </a:schemeClr>
+              </a:buClr>
+              <a:buFont typeface="Arial" panose="020B0604020202020204" pitchFamily="34" charset="0"/>
+              <a:buChar char="▌"/>
+            </a:pPr>
             <a:r>
               <a:rPr lang="en-US" dirty="0"/>
               <a:t>Encoding</a:t>
@@ -8067,8 +8211,8 @@
         </p:blipFill>
         <p:spPr>
           <a:xfrm>
-            <a:off x="1009650" y="3128964"/>
-            <a:ext cx="10344150" cy="2757486"/>
+            <a:off x="490195" y="3072402"/>
+            <a:ext cx="11170762" cy="2611961"/>
           </a:xfrm>
           <a:prstGeom prst="rect">
             <a:avLst/>
@@ -8165,6 +8309,15 @@
           <a:bodyPr/>
           <a:lstStyle/>
           <a:p>
+            <a:pPr marL="285750" indent="-285750">
+              <a:buClr>
+                <a:schemeClr val="accent1">
+                  <a:lumMod val="75000"/>
+                </a:schemeClr>
+              </a:buClr>
+              <a:buFont typeface="Arial" panose="020B0604020202020204" pitchFamily="34" charset="0"/>
+              <a:buChar char="▌"/>
+            </a:pPr>
             <a:r>
               <a:rPr lang="en-US" dirty="0"/>
               <a:t>Normalization for Classification vs Regression</a:t>
@@ -8198,7 +8351,7 @@
           <a:p>
             <a:fld id="{61019BA1-E988-4352-9936-E8B4BA34E226}" type="datetime1">
               <a:rPr lang="de-DE" smtClean="0"/>
-              <a:t>08.07.2020</a:t>
+              <a:t>10.07.2020</a:t>
             </a:fld>
             <a:endParaRPr lang="de-DE"/>
           </a:p>
@@ -8289,8 +8442,8 @@
         </p:blipFill>
         <p:spPr>
           <a:xfrm>
-            <a:off x="1054100" y="3028950"/>
-            <a:ext cx="10299700" cy="2971799"/>
+            <a:off x="452487" y="3028951"/>
+            <a:ext cx="11217897" cy="2664840"/>
           </a:xfrm>
           <a:prstGeom prst="rect">
             <a:avLst/>
@@ -8387,6 +8540,15 @@
           <a:bodyPr/>
           <a:lstStyle/>
           <a:p>
+            <a:pPr marL="285750" indent="-285750">
+              <a:buClr>
+                <a:schemeClr val="accent1">
+                  <a:lumMod val="75000"/>
+                </a:schemeClr>
+              </a:buClr>
+              <a:buFont typeface="Arial" panose="020B0604020202020204" pitchFamily="34" charset="0"/>
+              <a:buChar char="▌"/>
+            </a:pPr>
             <a:r>
               <a:rPr lang="en-US" dirty="0"/>
               <a:t>Encoding</a:t>
@@ -8420,7 +8582,7 @@
           <a:p>
             <a:fld id="{C1EF57CE-BBA6-43ED-94BC-1095B629580F}" type="datetime1">
               <a:rPr lang="de-DE" smtClean="0"/>
-              <a:t>08.07.2020</a:t>
+              <a:t>10.07.2020</a:t>
             </a:fld>
             <a:endParaRPr lang="de-DE"/>
           </a:p>
@@ -8483,42 +8645,6 @@
           </a:p>
         </p:txBody>
       </p:sp>
-      <p:pic>
-        <p:nvPicPr>
-          <p:cNvPr id="8" name="Picture 7">
-            <a:extLst>
-              <a:ext uri="{FF2B5EF4-FFF2-40B4-BE49-F238E27FC236}">
-                <a16:creationId xmlns:a16="http://schemas.microsoft.com/office/drawing/2014/main" id="{7307290B-EA04-004E-9260-EEB31260C899}"/>
-              </a:ext>
-            </a:extLst>
-          </p:cNvPr>
-          <p:cNvPicPr>
-            <a:picLocks noChangeAspect="1"/>
-          </p:cNvPicPr>
-          <p:nvPr/>
-        </p:nvPicPr>
-        <p:blipFill>
-          <a:blip r:embed="rId3">
-            <a:extLst>
-              <a:ext uri="{28A0092B-C50C-407E-A947-70E740481C1C}">
-                <a14:useLocalDpi xmlns:a14="http://schemas.microsoft.com/office/drawing/2010/main" val="0"/>
-              </a:ext>
-            </a:extLst>
-          </a:blip>
-          <a:stretch>
-            <a:fillRect/>
-          </a:stretch>
-        </p:blipFill>
-        <p:spPr>
-          <a:xfrm>
-            <a:off x="1292224" y="2686049"/>
-            <a:ext cx="4208463" cy="3490913"/>
-          </a:xfrm>
-          <a:prstGeom prst="rect">
-            <a:avLst/>
-          </a:prstGeom>
-        </p:spPr>
-      </p:pic>
       <p:sp>
         <p:nvSpPr>
           <p:cNvPr id="11" name="Right Arrow 10">
@@ -8580,7 +8706,7 @@
           <p:nvPr/>
         </p:nvPicPr>
         <p:blipFill>
-          <a:blip r:embed="rId4"/>
+          <a:blip r:embed="rId3"/>
           <a:stretch>
             <a:fillRect/>
           </a:stretch>
@@ -8589,6 +8715,36 @@
           <a:xfrm>
             <a:off x="6861176" y="2975785"/>
             <a:ext cx="5067300" cy="1895475"/>
+          </a:xfrm>
+          <a:prstGeom prst="rect">
+            <a:avLst/>
+          </a:prstGeom>
+        </p:spPr>
+      </p:pic>
+      <p:pic>
+        <p:nvPicPr>
+          <p:cNvPr id="10" name="Picture 9">
+            <a:extLst>
+              <a:ext uri="{FF2B5EF4-FFF2-40B4-BE49-F238E27FC236}">
+                <a16:creationId xmlns:a16="http://schemas.microsoft.com/office/drawing/2014/main" id="{6FD7B387-C0AC-41E4-BCFC-F7985FE16E83}"/>
+              </a:ext>
+            </a:extLst>
+          </p:cNvPr>
+          <p:cNvPicPr>
+            <a:picLocks noChangeAspect="1"/>
+          </p:cNvPicPr>
+          <p:nvPr/>
+        </p:nvPicPr>
+        <p:blipFill>
+          <a:blip r:embed="rId4"/>
+          <a:stretch>
+            <a:fillRect/>
+          </a:stretch>
+        </p:blipFill>
+        <p:spPr>
+          <a:xfrm>
+            <a:off x="1059608" y="2603554"/>
+            <a:ext cx="3905348" cy="3395371"/>
           </a:xfrm>
           <a:prstGeom prst="rect">
             <a:avLst/>
@@ -8760,107 +8916,102 @@
               </a:rPr>
               <a:t>techniques</a:t>
             </a:r>
-            <a:endParaRPr lang="de-DE" b="1" dirty="0">
-              <a:solidFill>
+            <a:endParaRPr lang="en-US" b="1" dirty="0"/>
+          </a:p>
+          <a:p>
+            <a:pPr marL="742950" lvl="1" indent="-285750">
+              <a:buClr>
                 <a:schemeClr val="accent1">
-                  <a:lumMod val="50000"/>
+                  <a:lumMod val="60000"/>
+                  <a:lumOff val="40000"/>
                 </a:schemeClr>
-              </a:solidFill>
-              <a:ea typeface="+mn-lt"/>
-              <a:cs typeface="+mn-lt"/>
-            </a:endParaRPr>
-          </a:p>
-          <a:p>
-            <a:pPr lvl="1">
-              <a:buFont typeface="Wingdings" panose="020B0604020202020204" pitchFamily="34" charset="0"/>
-              <a:buChar char="q"/>
+              </a:buClr>
+              <a:buFont typeface="Arial" panose="020B0604020202020204" pitchFamily="34" charset="0"/>
+              <a:buChar char="►"/>
             </a:pPr>
+            <a:r>
+              <a:rPr lang="en-US" dirty="0"/>
+              <a:t> </a:t>
+            </a:r>
+            <a:r>
+              <a:rPr lang="de-DE" dirty="0" err="1">
+                <a:ea typeface="+mn-lt"/>
+                <a:cs typeface="+mn-lt"/>
+              </a:rPr>
+              <a:t>Supervised</a:t>
+            </a:r>
             <a:r>
               <a:rPr lang="de-DE" dirty="0">
                 <a:ea typeface="+mn-lt"/>
                 <a:cs typeface="+mn-lt"/>
               </a:rPr>
-              <a:t> </a:t>
+              <a:t> </a:t>
             </a:r>
             <a:r>
               <a:rPr lang="de-DE" dirty="0" err="1">
                 <a:ea typeface="+mn-lt"/>
                 <a:cs typeface="+mn-lt"/>
               </a:rPr>
-              <a:t>Supervised</a:t>
+              <a:t>Machine</a:t>
             </a:r>
             <a:r>
               <a:rPr lang="de-DE" dirty="0">
                 <a:ea typeface="+mn-lt"/>
                 <a:cs typeface="+mn-lt"/>
               </a:rPr>
-              <a:t> </a:t>
+              <a:t> Learning </a:t>
             </a:r>
             <a:r>
               <a:rPr lang="de-DE" dirty="0" err="1">
                 <a:ea typeface="+mn-lt"/>
                 <a:cs typeface="+mn-lt"/>
               </a:rPr>
-              <a:t>Machine</a:t>
+              <a:t>Algorithms</a:t>
             </a:r>
             <a:r>
               <a:rPr lang="de-DE" dirty="0">
                 <a:ea typeface="+mn-lt"/>
                 <a:cs typeface="+mn-lt"/>
               </a:rPr>
-              <a:t> Learning </a:t>
+              <a:t>: Multi-</a:t>
             </a:r>
             <a:r>
               <a:rPr lang="de-DE" dirty="0" err="1">
                 <a:ea typeface="+mn-lt"/>
                 <a:cs typeface="+mn-lt"/>
               </a:rPr>
-              <a:t>Algorithms</a:t>
+              <a:t>class</a:t>
             </a:r>
             <a:r>
               <a:rPr lang="de-DE" dirty="0">
                 <a:ea typeface="+mn-lt"/>
                 <a:cs typeface="+mn-lt"/>
               </a:rPr>
-              <a:t>: Multi-</a:t>
+              <a:t> </a:t>
             </a:r>
             <a:r>
               <a:rPr lang="de-DE" dirty="0" err="1">
                 <a:ea typeface="+mn-lt"/>
                 <a:cs typeface="+mn-lt"/>
               </a:rPr>
-              <a:t>class</a:t>
-            </a:r>
-            <a:r>
-              <a:rPr lang="de-DE" dirty="0">
-                <a:ea typeface="+mn-lt"/>
-                <a:cs typeface="+mn-lt"/>
-              </a:rPr>
+              <a:t>classification</a:t>
+            </a:r>
+            <a:endParaRPr lang="en-US" b="1" dirty="0"/>
+          </a:p>
+          <a:p>
+            <a:pPr marL="742950" lvl="1" indent="-285750">
+              <a:buClr>
+                <a:schemeClr val="accent1">
+                  <a:lumMod val="60000"/>
+                  <a:lumOff val="40000"/>
+                </a:schemeClr>
+              </a:buClr>
+              <a:buFont typeface="Arial" panose="020B0604020202020204" pitchFamily="34" charset="0"/>
+              <a:buChar char="►"/>
+            </a:pPr>
+            <a:r>
+              <a:rPr lang="en-US" dirty="0"/>
               <a:t> </a:t>
-            </a:r>
-            <a:r>
-              <a:rPr lang="de-DE" dirty="0" err="1">
-                <a:ea typeface="+mn-lt"/>
-                <a:cs typeface="+mn-lt"/>
-              </a:rPr>
-              <a:t>classification</a:t>
-            </a:r>
-            <a:endParaRPr lang="de-DE" dirty="0">
-              <a:ea typeface="+mn-lt"/>
-              <a:cs typeface="+mn-lt"/>
-            </a:endParaRPr>
-          </a:p>
-          <a:p>
-            <a:pPr lvl="1">
-              <a:buFont typeface="Wingdings" panose="020B0604020202020204" pitchFamily="34" charset="0"/>
-              <a:buChar char="q"/>
-            </a:pPr>
-            <a:r>
-              <a:rPr lang="de-DE" dirty="0">
-                <a:ea typeface="+mn-lt"/>
-                <a:cs typeface="+mn-lt"/>
-              </a:rPr>
-              <a:t> </a:t>
             </a:r>
             <a:r>
               <a:rPr lang="de-DE" dirty="0" err="1">
@@ -8965,35 +9116,107 @@
               </a:rPr>
               <a:t> design</a:t>
             </a:r>
-          </a:p>
-          <a:p>
-            <a:pPr lvl="1">
-              <a:buFont typeface="Wingdings" panose="020B0604020202020204" pitchFamily="34" charset="0"/>
-              <a:buChar char="q"/>
+            <a:endParaRPr lang="en-US" b="1" dirty="0"/>
+          </a:p>
+          <a:p>
+            <a:pPr marL="742950" lvl="1" indent="-285750">
+              <a:buClr>
+                <a:schemeClr val="accent1">
+                  <a:lumMod val="60000"/>
+                  <a:lumOff val="40000"/>
+                </a:schemeClr>
+              </a:buClr>
+              <a:buFont typeface="Arial" panose="020B0604020202020204" pitchFamily="34" charset="0"/>
+              <a:buChar char="►"/>
             </a:pPr>
+            <a:r>
+              <a:rPr lang="en-US" dirty="0"/>
+              <a:t> </a:t>
+            </a:r>
             <a:r>
               <a:rPr lang="de-DE" dirty="0">
                 <a:ea typeface="+mn-lt"/>
                 <a:cs typeface="+mn-lt"/>
               </a:rPr>
-              <a:t> Data Splitting:</a:t>
-            </a:r>
-            <a:endParaRPr lang="de-DE" u="sng" dirty="0">
+              <a:t>Data Splitting:</a:t>
+            </a:r>
+            <a:endParaRPr lang="en-US" b="1" dirty="0"/>
+          </a:p>
+          <a:p>
+            <a:pPr marL="1200150" lvl="2" indent="-285750">
+              <a:buClr>
+                <a:schemeClr val="accent1">
+                  <a:lumMod val="60000"/>
+                  <a:lumOff val="40000"/>
+                </a:schemeClr>
+              </a:buClr>
+              <a:buFont typeface="Arial" panose="020B0604020202020204" pitchFamily="34" charset="0"/>
+              <a:buChar char="►"/>
+            </a:pPr>
+            <a:r>
+              <a:rPr lang="de-DE" sz="1800" dirty="0">
+                <a:ea typeface="+mn-lt"/>
+                <a:cs typeface="+mn-lt"/>
+              </a:rPr>
+              <a:t>Training </a:t>
+            </a:r>
+            <a:r>
+              <a:rPr lang="de-DE" sz="1800" dirty="0" err="1">
+                <a:ea typeface="+mn-lt"/>
+                <a:cs typeface="+mn-lt"/>
+              </a:rPr>
+              <a:t>set</a:t>
+            </a:r>
+            <a:r>
+              <a:rPr lang="de-DE" sz="1800" dirty="0">
+                <a:ea typeface="+mn-lt"/>
+                <a:cs typeface="+mn-lt"/>
+              </a:rPr>
+              <a:t> (70%) and Test </a:t>
+            </a:r>
+            <a:r>
+              <a:rPr lang="de-DE" sz="1800" dirty="0" err="1">
+                <a:ea typeface="+mn-lt"/>
+                <a:cs typeface="+mn-lt"/>
+              </a:rPr>
+              <a:t>set</a:t>
+            </a:r>
+            <a:r>
+              <a:rPr lang="de-DE" sz="1800" dirty="0">
+                <a:ea typeface="+mn-lt"/>
+                <a:cs typeface="+mn-lt"/>
+              </a:rPr>
+              <a:t> (30%) not </a:t>
+            </a:r>
+            <a:r>
+              <a:rPr lang="de-DE" sz="1800" dirty="0" err="1">
+                <a:ea typeface="+mn-lt"/>
+                <a:cs typeface="+mn-lt"/>
+              </a:rPr>
+              <a:t>shuffled</a:t>
+            </a:r>
+            <a:endParaRPr lang="de-DE" sz="1400" u="sng" dirty="0">
               <a:ea typeface="+mn-lt"/>
               <a:cs typeface="+mn-lt"/>
             </a:endParaRPr>
           </a:p>
           <a:p>
-            <a:pPr lvl="2">
-              <a:buFont typeface="Courier New" panose="020B0604020202020204" pitchFamily="34" charset="0"/>
-              <a:buChar char="o"/>
+            <a:pPr marL="1200150" lvl="2" indent="-285750">
+              <a:buClr>
+                <a:schemeClr val="accent1">
+                  <a:lumMod val="60000"/>
+                  <a:lumOff val="40000"/>
+                </a:schemeClr>
+              </a:buClr>
+              <a:buFont typeface="Arial" panose="020B0604020202020204" pitchFamily="34" charset="0"/>
+              <a:buChar char="►"/>
             </a:pPr>
             <a:r>
               <a:rPr lang="de-DE" sz="1800" dirty="0">
                 <a:ea typeface="+mn-lt"/>
                 <a:cs typeface="+mn-lt"/>
               </a:rPr>
-              <a:t>Training </a:t>
+              <a:t>Test </a:t>
             </a:r>
             <a:r>
               <a:rPr lang="de-DE" sz="1800" dirty="0" err="1">
@@ -9007,7 +9230,7 @@
                 <a:ea typeface="+mn-lt"/>
                 <a:cs typeface="+mn-lt"/>
               </a:rPr>
-              <a:t> (70%) and Test </a:t>
+              <a:t> (5%), Training </a:t>
             </a:r>
             <a:r>
               <a:rPr lang="de-DE" sz="1800" dirty="0" err="1">
@@ -9021,80 +9244,70 @@
                 <a:ea typeface="+mn-lt"/>
                 <a:cs typeface="+mn-lt"/>
               </a:rPr>
-              <a:t> (30%) not </a:t>
+              <a:t> (80% </a:t>
             </a:r>
             <a:r>
               <a:rPr lang="de-DE" sz="1800" dirty="0" err="1">
                 <a:ea typeface="+mn-lt"/>
                 <a:cs typeface="+mn-lt"/>
               </a:rPr>
-              <a:t>shuffled</a:t>
-            </a:r>
-            <a:endParaRPr lang="de-DE" sz="1800" u="sng" dirty="0">
-              <a:ea typeface="+mn-lt"/>
-              <a:cs typeface="+mn-lt"/>
-            </a:endParaRPr>
-          </a:p>
-          <a:p>
-            <a:pPr lvl="2">
-              <a:buFont typeface="Courier New" panose="020B0604020202020204" pitchFamily="34" charset="0"/>
-              <a:buChar char="o"/>
-            </a:pPr>
+              <a:t>of</a:t>
+            </a:r>
             <a:r>
               <a:rPr lang="de-DE" sz="1800" dirty="0">
                 <a:ea typeface="+mn-lt"/>
                 <a:cs typeface="+mn-lt"/>
               </a:rPr>
-              <a:t>Test </a:t>
+              <a:t> </a:t>
             </a:r>
             <a:r>
               <a:rPr lang="de-DE" sz="1800" dirty="0" err="1">
                 <a:ea typeface="+mn-lt"/>
                 <a:cs typeface="+mn-lt"/>
               </a:rPr>
-              <a:t>set</a:t>
+              <a:t>the</a:t>
             </a:r>
             <a:r>
               <a:rPr lang="de-DE" sz="1800" dirty="0">
                 <a:ea typeface="+mn-lt"/>
                 <a:cs typeface="+mn-lt"/>
               </a:rPr>
-              <a:t> (5%), Training </a:t>
+              <a:t> </a:t>
             </a:r>
             <a:r>
               <a:rPr lang="de-DE" sz="1800" dirty="0" err="1">
                 <a:ea typeface="+mn-lt"/>
                 <a:cs typeface="+mn-lt"/>
               </a:rPr>
-              <a:t>set</a:t>
+              <a:t>remaining</a:t>
             </a:r>
             <a:r>
               <a:rPr lang="de-DE" sz="1800" dirty="0">
                 <a:ea typeface="+mn-lt"/>
                 <a:cs typeface="+mn-lt"/>
               </a:rPr>
-              <a:t> (80% </a:t>
+              <a:t> 95%) and Validation </a:t>
             </a:r>
             <a:r>
               <a:rPr lang="de-DE" sz="1800" dirty="0" err="1">
                 <a:ea typeface="+mn-lt"/>
                 <a:cs typeface="+mn-lt"/>
               </a:rPr>
-              <a:t>of</a:t>
+              <a:t>set</a:t>
             </a:r>
             <a:r>
               <a:rPr lang="de-DE" sz="1800" dirty="0">
                 <a:ea typeface="+mn-lt"/>
                 <a:cs typeface="+mn-lt"/>
               </a:rPr>
-              <a:t> </a:t>
+              <a:t> (20% </a:t>
             </a:r>
             <a:r>
               <a:rPr lang="de-DE" sz="1800" dirty="0" err="1">
                 <a:ea typeface="+mn-lt"/>
                 <a:cs typeface="+mn-lt"/>
               </a:rPr>
-              <a:t>the</a:t>
+              <a:t>of</a:t>
             </a:r>
             <a:r>
               <a:rPr lang="de-DE" sz="1800" dirty="0">
@@ -9108,81 +9321,46 @@
                 <a:ea typeface="+mn-lt"/>
                 <a:cs typeface="+mn-lt"/>
               </a:rPr>
-              <a:t>remaining</a:t>
+              <a:t>the</a:t>
             </a:r>
             <a:r>
               <a:rPr lang="de-DE" sz="1800" dirty="0">
                 <a:ea typeface="+mn-lt"/>
                 <a:cs typeface="+mn-lt"/>
               </a:rPr>
-              <a:t> 95%) and Validation </a:t>
+              <a:t> </a:t>
             </a:r>
             <a:r>
               <a:rPr lang="de-DE" sz="1800" dirty="0" err="1">
                 <a:ea typeface="+mn-lt"/>
                 <a:cs typeface="+mn-lt"/>
               </a:rPr>
-              <a:t>set</a:t>
+              <a:t>remaining</a:t>
             </a:r>
             <a:r>
               <a:rPr lang="de-DE" sz="1800" dirty="0">
                 <a:ea typeface="+mn-lt"/>
                 <a:cs typeface="+mn-lt"/>
               </a:rPr>
-              <a:t> (20% </a:t>
-            </a:r>
-            <a:r>
-              <a:rPr lang="de-DE" sz="1800" dirty="0" err="1">
-                <a:ea typeface="+mn-lt"/>
-                <a:cs typeface="+mn-lt"/>
-              </a:rPr>
-              <a:t>of</a:t>
-            </a:r>
-            <a:r>
-              <a:rPr lang="de-DE" sz="1800" dirty="0">
-                <a:ea typeface="+mn-lt"/>
-                <a:cs typeface="+mn-lt"/>
-              </a:rPr>
+              <a:t> 95%) </a:t>
+            </a:r>
+            <a:endParaRPr lang="en-US" b="1" dirty="0"/>
+          </a:p>
+          <a:p>
+            <a:pPr marL="742950" lvl="1" indent="-285750">
+              <a:buClr>
+                <a:schemeClr val="accent1">
+                  <a:lumMod val="60000"/>
+                  <a:lumOff val="40000"/>
+                </a:schemeClr>
+              </a:buClr>
+              <a:buFont typeface="Arial" panose="020B0604020202020204" pitchFamily="34" charset="0"/>
+              <a:buChar char="►"/>
+            </a:pPr>
+            <a:r>
+              <a:rPr lang="en-US" dirty="0"/>
               <a:t> </a:t>
             </a:r>
-            <a:r>
-              <a:rPr lang="de-DE" sz="1800" dirty="0" err="1">
-                <a:ea typeface="+mn-lt"/>
-                <a:cs typeface="+mn-lt"/>
-              </a:rPr>
-              <a:t>the</a:t>
-            </a:r>
-            <a:r>
-              <a:rPr lang="de-DE" sz="1800" dirty="0">
-                <a:ea typeface="+mn-lt"/>
-                <a:cs typeface="+mn-lt"/>
-              </a:rPr>
-              <a:t> </a:t>
-            </a:r>
-            <a:r>
-              <a:rPr lang="de-DE" sz="1800" dirty="0" err="1">
-                <a:ea typeface="+mn-lt"/>
-                <a:cs typeface="+mn-lt"/>
-              </a:rPr>
-              <a:t>remaining</a:t>
-            </a:r>
-            <a:r>
-              <a:rPr lang="de-DE" sz="1800" dirty="0">
-                <a:ea typeface="+mn-lt"/>
-                <a:cs typeface="+mn-lt"/>
-              </a:rPr>
-              <a:t> 95%) </a:t>
-            </a:r>
-            <a:endParaRPr lang="de-DE" sz="1800" u="sng" dirty="0">
-              <a:ea typeface="+mn-lt"/>
-              <a:cs typeface="+mn-lt"/>
-            </a:endParaRPr>
-          </a:p>
-          <a:p>
-            <a:pPr lvl="1">
-              <a:buFont typeface="Wingdings" panose="020B0604020202020204" pitchFamily="34" charset="0"/>
-              <a:buChar char="q"/>
-            </a:pPr>
             <a:r>
               <a:rPr lang="de-DE" dirty="0">
                 <a:ea typeface="+mn-lt"/>
@@ -9316,12 +9494,23 @@
               </a:rPr>
               <a:t>)</a:t>
             </a:r>
-          </a:p>
-          <a:p>
-            <a:pPr lvl="1">
-              <a:buFont typeface="Wingdings" panose="020B0604020202020204" pitchFamily="34" charset="0"/>
-              <a:buChar char="q"/>
+            <a:endParaRPr lang="en-US" b="1" dirty="0"/>
+          </a:p>
+          <a:p>
+            <a:pPr marL="742950" lvl="1" indent="-285750">
+              <a:buClr>
+                <a:schemeClr val="accent1">
+                  <a:lumMod val="60000"/>
+                  <a:lumOff val="40000"/>
+                </a:schemeClr>
+              </a:buClr>
+              <a:buFont typeface="Arial" panose="020B0604020202020204" pitchFamily="34" charset="0"/>
+              <a:buChar char="►"/>
             </a:pPr>
+            <a:r>
+              <a:rPr lang="en-US" dirty="0"/>
+              <a:t> </a:t>
+            </a:r>
             <a:r>
               <a:rPr lang="de-DE" dirty="0">
                 <a:ea typeface="+mn-lt"/>
@@ -9441,7 +9630,7 @@
           <a:p>
             <a:fld id="{3FFEE27C-4C75-402F-86D4-D52044750E31}" type="datetime1">
               <a:rPr lang="de-DE" smtClean="0"/>
-              <a:t>08.07.2020</a:t>
+              <a:t>10.07.2020</a:t>
             </a:fld>
             <a:endParaRPr lang="de-DE"/>
           </a:p>
@@ -9594,295 +9783,6 @@
       </p:sp>
       <p:sp>
         <p:nvSpPr>
-          <p:cNvPr id="3" name="Content Placeholder 2">
-            <a:extLst>
-              <a:ext uri="{FF2B5EF4-FFF2-40B4-BE49-F238E27FC236}">
-                <a16:creationId xmlns:a16="http://schemas.microsoft.com/office/drawing/2014/main" id="{2E801F55-8E3C-4A72-AFA7-D42A10B2B979}"/>
-              </a:ext>
-            </a:extLst>
-          </p:cNvPr>
-          <p:cNvSpPr>
-            <a:spLocks noGrp="1"/>
-          </p:cNvSpPr>
-          <p:nvPr>
-            <p:ph idx="1"/>
-          </p:nvPr>
-        </p:nvSpPr>
-        <p:spPr/>
-        <p:txBody>
-          <a:bodyPr vert="horz" lIns="91440" tIns="45720" rIns="91440" bIns="45720" rtlCol="0" anchor="t">
-            <a:normAutofit/>
-          </a:bodyPr>
-          <a:lstStyle/>
-          <a:p>
-            <a:pPr marL="0" indent="0">
-              <a:buNone/>
-            </a:pPr>
-            <a:r>
-              <a:rPr lang="de-DE" dirty="0">
-                <a:solidFill>
-                  <a:schemeClr val="accent1">
-                    <a:lumMod val="50000"/>
-                  </a:schemeClr>
-                </a:solidFill>
-                <a:cs typeface="Calibri"/>
-              </a:rPr>
-              <a:t>3.  </a:t>
-            </a:r>
-            <a:r>
-              <a:rPr lang="de-DE" b="1" dirty="0">
-                <a:solidFill>
-                  <a:schemeClr val="accent1">
-                    <a:lumMod val="50000"/>
-                  </a:schemeClr>
-                </a:solidFill>
-                <a:cs typeface="Calibri"/>
-              </a:rPr>
-              <a:t> </a:t>
-            </a:r>
-            <a:r>
-              <a:rPr lang="de-DE" b="1" dirty="0" err="1">
-                <a:solidFill>
-                  <a:schemeClr val="accent1">
-                    <a:lumMod val="50000"/>
-                  </a:schemeClr>
-                </a:solidFill>
-                <a:cs typeface="Calibri"/>
-              </a:rPr>
-              <a:t>Build</a:t>
-            </a:r>
-            <a:r>
-              <a:rPr lang="de-DE" b="1" dirty="0">
-                <a:solidFill>
-                  <a:schemeClr val="accent1">
-                    <a:lumMod val="50000"/>
-                  </a:schemeClr>
-                </a:solidFill>
-                <a:cs typeface="Calibri"/>
-              </a:rPr>
-              <a:t> Models</a:t>
-            </a:r>
-            <a:endParaRPr lang="en-US" b="1" dirty="0">
-              <a:solidFill>
-                <a:schemeClr val="accent1">
-                  <a:lumMod val="50000"/>
-                </a:schemeClr>
-              </a:solidFill>
-              <a:ea typeface="+mn-lt"/>
-              <a:cs typeface="+mn-lt"/>
-            </a:endParaRPr>
-          </a:p>
-          <a:p>
-            <a:pPr lvl="1">
-              <a:buFont typeface="Wingdings,Sans-Serif" panose="020B0604020202020204" pitchFamily="34" charset="0"/>
-              <a:buChar char="q"/>
-            </a:pPr>
-            <a:r>
-              <a:rPr lang="de-DE" sz="2600" u="sng" dirty="0">
-                <a:cs typeface="Calibri"/>
-              </a:rPr>
-              <a:t> </a:t>
-            </a:r>
-            <a:r>
-              <a:rPr lang="de-DE" sz="2600" u="sng" dirty="0" err="1">
-                <a:cs typeface="Calibri"/>
-              </a:rPr>
-              <a:t>Decision</a:t>
-            </a:r>
-            <a:r>
-              <a:rPr lang="de-DE" sz="2600" u="sng" dirty="0">
-                <a:cs typeface="Calibri"/>
-              </a:rPr>
-              <a:t> </a:t>
-            </a:r>
-            <a:r>
-              <a:rPr lang="de-DE" sz="2600" u="sng" dirty="0" err="1">
-                <a:cs typeface="Calibri"/>
-              </a:rPr>
-              <a:t>Tree</a:t>
-            </a:r>
-            <a:endParaRPr lang="de-DE" sz="2600" u="sng" dirty="0">
-              <a:ea typeface="+mn-lt"/>
-              <a:cs typeface="+mn-lt"/>
-            </a:endParaRPr>
-          </a:p>
-          <a:p>
-            <a:pPr lvl="2">
-              <a:buFont typeface="Wingdings" panose="020B0604020202020204" pitchFamily="34" charset="0"/>
-              <a:buChar char="ü"/>
-            </a:pPr>
-            <a:r>
-              <a:rPr lang="de-DE" sz="2400" dirty="0">
-                <a:solidFill>
-                  <a:srgbClr val="000000"/>
-                </a:solidFill>
-                <a:cs typeface="Calibri"/>
-              </a:rPr>
-              <a:t>Dataset: </a:t>
-            </a:r>
-            <a:r>
-              <a:rPr lang="de-DE" sz="2400" dirty="0">
-                <a:ea typeface="+mn-lt"/>
-                <a:cs typeface="+mn-lt"/>
-              </a:rPr>
-              <a:t>First </a:t>
-            </a:r>
-            <a:r>
-              <a:rPr lang="de-DE" sz="2400" dirty="0" err="1">
-                <a:ea typeface="+mn-lt"/>
-                <a:cs typeface="+mn-lt"/>
-              </a:rPr>
-              <a:t>sliding</a:t>
-            </a:r>
-            <a:r>
-              <a:rPr lang="de-DE" sz="2400" dirty="0">
-                <a:ea typeface="+mn-lt"/>
-                <a:cs typeface="+mn-lt"/>
-              </a:rPr>
-              <a:t> </a:t>
-            </a:r>
-            <a:r>
-              <a:rPr lang="de-DE" sz="2400" dirty="0" err="1">
-                <a:ea typeface="+mn-lt"/>
-                <a:cs typeface="+mn-lt"/>
-              </a:rPr>
-              <a:t>window</a:t>
-            </a:r>
-            <a:r>
-              <a:rPr lang="de-DE" sz="2400" dirty="0">
-                <a:ea typeface="+mn-lt"/>
-                <a:cs typeface="+mn-lt"/>
-              </a:rPr>
-              <a:t> </a:t>
-            </a:r>
-            <a:r>
-              <a:rPr lang="de-DE" sz="2400" dirty="0" err="1">
-                <a:ea typeface="+mn-lt"/>
-                <a:cs typeface="+mn-lt"/>
-              </a:rPr>
-              <a:t>option</a:t>
-            </a:r>
-            <a:r>
-              <a:rPr lang="de-DE" sz="2400" dirty="0">
-                <a:ea typeface="+mn-lt"/>
-                <a:cs typeface="+mn-lt"/>
-              </a:rPr>
-              <a:t> (13 </a:t>
-            </a:r>
-            <a:r>
-              <a:rPr lang="de-DE" sz="2400" dirty="0" err="1">
-                <a:ea typeface="+mn-lt"/>
-                <a:cs typeface="+mn-lt"/>
-              </a:rPr>
-              <a:t>features</a:t>
-            </a:r>
-            <a:r>
-              <a:rPr lang="de-DE" sz="2400" dirty="0">
-                <a:ea typeface="+mn-lt"/>
-                <a:cs typeface="+mn-lt"/>
-              </a:rPr>
-              <a:t>)</a:t>
-            </a:r>
-          </a:p>
-          <a:p>
-            <a:pPr lvl="2">
-              <a:buFont typeface="Wingdings" panose="020B0604020202020204" pitchFamily="34" charset="0"/>
-              <a:buChar char="ü"/>
-            </a:pPr>
-            <a:r>
-              <a:rPr lang="de-DE" sz="2400" dirty="0">
-                <a:cs typeface="Calibri"/>
-              </a:rPr>
-              <a:t>Depth </a:t>
-            </a:r>
-            <a:r>
-              <a:rPr lang="de-DE" sz="2400" dirty="0" err="1">
-                <a:cs typeface="Calibri"/>
-              </a:rPr>
-              <a:t>of</a:t>
-            </a:r>
-            <a:r>
-              <a:rPr lang="de-DE" sz="2400" dirty="0">
-                <a:cs typeface="Calibri"/>
-              </a:rPr>
-              <a:t> </a:t>
-            </a:r>
-            <a:r>
-              <a:rPr lang="de-DE" sz="2400" dirty="0" err="1">
-                <a:cs typeface="Calibri"/>
-              </a:rPr>
-              <a:t>the</a:t>
-            </a:r>
-            <a:r>
-              <a:rPr lang="de-DE" sz="2400" dirty="0">
-                <a:cs typeface="Calibri"/>
-              </a:rPr>
-              <a:t> </a:t>
-            </a:r>
-            <a:r>
-              <a:rPr lang="de-DE" sz="2400" dirty="0" err="1">
-                <a:cs typeface="Calibri"/>
-              </a:rPr>
-              <a:t>tree</a:t>
-            </a:r>
-            <a:r>
-              <a:rPr lang="de-DE" sz="2400" dirty="0">
-                <a:cs typeface="Calibri"/>
-              </a:rPr>
-              <a:t>: 4</a:t>
-            </a:r>
-          </a:p>
-          <a:p>
-            <a:pPr lvl="2">
-              <a:buFont typeface="Wingdings" panose="020B0604020202020204" pitchFamily="34" charset="0"/>
-              <a:buChar char="ü"/>
-            </a:pPr>
-            <a:r>
-              <a:rPr lang="de-DE" sz="2400" dirty="0" err="1">
-                <a:cs typeface="Calibri"/>
-              </a:rPr>
-              <a:t>Accuracy</a:t>
-            </a:r>
-            <a:r>
-              <a:rPr lang="de-DE" sz="2400" dirty="0">
-                <a:cs typeface="Calibri"/>
-              </a:rPr>
-              <a:t>: 52.95%</a:t>
-            </a:r>
-            <a:endParaRPr lang="de-DE" sz="2400" dirty="0">
-              <a:solidFill>
-                <a:srgbClr val="000000"/>
-              </a:solidFill>
-              <a:cs typeface="Calibri"/>
-            </a:endParaRPr>
-          </a:p>
-          <a:p>
-            <a:pPr marL="914400" lvl="2" indent="0">
-              <a:buNone/>
-            </a:pPr>
-            <a:endParaRPr lang="de-DE" dirty="0">
-              <a:solidFill>
-                <a:srgbClr val="000000"/>
-              </a:solidFill>
-              <a:cs typeface="Calibri"/>
-            </a:endParaRPr>
-          </a:p>
-          <a:p>
-            <a:pPr lvl="1">
-              <a:buFont typeface="Wingdings,Sans-Serif" panose="020B0604020202020204" pitchFamily="34" charset="0"/>
-              <a:buChar char="q"/>
-            </a:pPr>
-            <a:endParaRPr lang="de-DE" dirty="0">
-              <a:solidFill>
-                <a:srgbClr val="000000"/>
-              </a:solidFill>
-              <a:cs typeface="Calibri"/>
-            </a:endParaRPr>
-          </a:p>
-        </p:txBody>
-      </p:sp>
-      <p:sp>
-        <p:nvSpPr>
           <p:cNvPr id="4" name="Date Placeholder 3">
             <a:extLst>
               <a:ext uri="{FF2B5EF4-FFF2-40B4-BE49-F238E27FC236}">
@@ -9904,7 +9804,7 @@
           <a:p>
             <a:fld id="{0298CE40-95A1-44A6-875C-8992484B9971}" type="datetime1">
               <a:rPr lang="de-DE" smtClean="0"/>
-              <a:t>08.07.2020</a:t>
+              <a:t>10.07.2020</a:t>
             </a:fld>
             <a:endParaRPr lang="de-DE"/>
           </a:p>
@@ -9997,6 +9897,289 @@
           </a:prstGeom>
         </p:spPr>
       </p:pic>
+      <p:sp>
+        <p:nvSpPr>
+          <p:cNvPr id="3" name="Content Placeholder 2">
+            <a:extLst>
+              <a:ext uri="{FF2B5EF4-FFF2-40B4-BE49-F238E27FC236}">
+                <a16:creationId xmlns:a16="http://schemas.microsoft.com/office/drawing/2014/main" id="{2E801F55-8E3C-4A72-AFA7-D42A10B2B979}"/>
+              </a:ext>
+            </a:extLst>
+          </p:cNvPr>
+          <p:cNvSpPr>
+            <a:spLocks noGrp="1"/>
+          </p:cNvSpPr>
+          <p:nvPr>
+            <p:ph idx="1"/>
+          </p:nvPr>
+        </p:nvSpPr>
+        <p:spPr/>
+        <p:txBody>
+          <a:bodyPr vert="horz" lIns="91440" tIns="45720" rIns="91440" bIns="45720" rtlCol="0" anchor="t">
+            <a:normAutofit/>
+          </a:bodyPr>
+          <a:lstStyle/>
+          <a:p>
+            <a:pPr marL="0" indent="0">
+              <a:buNone/>
+            </a:pPr>
+            <a:r>
+              <a:rPr lang="de-DE" b="1" dirty="0">
+                <a:solidFill>
+                  <a:schemeClr val="accent1">
+                    <a:lumMod val="50000"/>
+                  </a:schemeClr>
+                </a:solidFill>
+                <a:cs typeface="Calibri"/>
+              </a:rPr>
+              <a:t>3.   </a:t>
+            </a:r>
+            <a:r>
+              <a:rPr lang="de-DE" b="1" dirty="0" err="1">
+                <a:solidFill>
+                  <a:schemeClr val="accent1">
+                    <a:lumMod val="50000"/>
+                  </a:schemeClr>
+                </a:solidFill>
+                <a:cs typeface="Calibri"/>
+              </a:rPr>
+              <a:t>Build</a:t>
+            </a:r>
+            <a:r>
+              <a:rPr lang="de-DE" b="1" dirty="0">
+                <a:solidFill>
+                  <a:schemeClr val="accent1">
+                    <a:lumMod val="50000"/>
+                  </a:schemeClr>
+                </a:solidFill>
+                <a:cs typeface="Calibri"/>
+              </a:rPr>
+              <a:t> Models</a:t>
+            </a:r>
+            <a:endParaRPr lang="en-US" b="1" dirty="0">
+              <a:solidFill>
+                <a:schemeClr val="accent1">
+                  <a:lumMod val="50000"/>
+                </a:schemeClr>
+              </a:solidFill>
+              <a:ea typeface="+mn-lt"/>
+              <a:cs typeface="+mn-lt"/>
+            </a:endParaRPr>
+          </a:p>
+          <a:p>
+            <a:pPr marL="285750" indent="-285750">
+              <a:buClr>
+                <a:schemeClr val="accent1">
+                  <a:lumMod val="75000"/>
+                </a:schemeClr>
+              </a:buClr>
+              <a:buFont typeface="Arial" panose="020B0604020202020204" pitchFamily="34" charset="0"/>
+              <a:buChar char="▌"/>
+            </a:pPr>
+            <a:r>
+              <a:rPr lang="de-DE" sz="2600" u="sng" dirty="0" err="1">
+                <a:cs typeface="Calibri"/>
+              </a:rPr>
+              <a:t>Decision</a:t>
+            </a:r>
+            <a:r>
+              <a:rPr lang="de-DE" sz="2600" u="sng" dirty="0">
+                <a:cs typeface="Calibri"/>
+              </a:rPr>
+              <a:t> </a:t>
+            </a:r>
+            <a:r>
+              <a:rPr lang="de-DE" sz="2600" u="sng" dirty="0" err="1">
+                <a:cs typeface="Calibri"/>
+              </a:rPr>
+              <a:t>Tree</a:t>
+            </a:r>
+            <a:endParaRPr lang="en-US" b="1" dirty="0"/>
+          </a:p>
+          <a:p>
+            <a:pPr marL="742950" lvl="1" indent="-285750">
+              <a:buClr>
+                <a:schemeClr val="accent1">
+                  <a:lumMod val="60000"/>
+                  <a:lumOff val="40000"/>
+                </a:schemeClr>
+              </a:buClr>
+              <a:buFont typeface="Arial" panose="020B0604020202020204" pitchFamily="34" charset="0"/>
+              <a:buChar char="►"/>
+            </a:pPr>
+            <a:r>
+              <a:rPr lang="en-US" dirty="0"/>
+              <a:t> </a:t>
+            </a:r>
+            <a:r>
+              <a:rPr lang="de-DE" sz="2400" dirty="0">
+                <a:solidFill>
+                  <a:srgbClr val="000000"/>
+                </a:solidFill>
+                <a:cs typeface="Calibri"/>
+              </a:rPr>
+              <a:t>Dataset: </a:t>
+            </a:r>
+            <a:r>
+              <a:rPr lang="de-DE" sz="2400" dirty="0">
+                <a:ea typeface="+mn-lt"/>
+                <a:cs typeface="+mn-lt"/>
+              </a:rPr>
+              <a:t>First </a:t>
+            </a:r>
+            <a:r>
+              <a:rPr lang="de-DE" sz="2400" dirty="0" err="1">
+                <a:ea typeface="+mn-lt"/>
+                <a:cs typeface="+mn-lt"/>
+              </a:rPr>
+              <a:t>sliding</a:t>
+            </a:r>
+            <a:r>
+              <a:rPr lang="de-DE" sz="2400" dirty="0">
+                <a:ea typeface="+mn-lt"/>
+                <a:cs typeface="+mn-lt"/>
+              </a:rPr>
+              <a:t> </a:t>
+            </a:r>
+            <a:r>
+              <a:rPr lang="de-DE" sz="2400" dirty="0" err="1">
+                <a:ea typeface="+mn-lt"/>
+                <a:cs typeface="+mn-lt"/>
+              </a:rPr>
+              <a:t>window</a:t>
+            </a:r>
+            <a:r>
+              <a:rPr lang="de-DE" sz="2400" dirty="0">
+                <a:ea typeface="+mn-lt"/>
+                <a:cs typeface="+mn-lt"/>
+              </a:rPr>
+              <a:t> </a:t>
+            </a:r>
+            <a:r>
+              <a:rPr lang="de-DE" sz="2400" dirty="0" err="1">
+                <a:ea typeface="+mn-lt"/>
+                <a:cs typeface="+mn-lt"/>
+              </a:rPr>
+              <a:t>option</a:t>
+            </a:r>
+            <a:r>
+              <a:rPr lang="de-DE" sz="2400" dirty="0">
+                <a:ea typeface="+mn-lt"/>
+                <a:cs typeface="+mn-lt"/>
+              </a:rPr>
+              <a:t> (13 </a:t>
+            </a:r>
+            <a:r>
+              <a:rPr lang="de-DE" sz="2400" dirty="0" err="1">
+                <a:ea typeface="+mn-lt"/>
+                <a:cs typeface="+mn-lt"/>
+              </a:rPr>
+              <a:t>features</a:t>
+            </a:r>
+            <a:r>
+              <a:rPr lang="de-DE" sz="2400" dirty="0">
+                <a:ea typeface="+mn-lt"/>
+                <a:cs typeface="+mn-lt"/>
+              </a:rPr>
+              <a:t>)</a:t>
+            </a:r>
+            <a:endParaRPr lang="en-US" b="1" dirty="0"/>
+          </a:p>
+          <a:p>
+            <a:pPr marL="742950" lvl="1" indent="-285750">
+              <a:buClr>
+                <a:schemeClr val="accent1">
+                  <a:lumMod val="60000"/>
+                  <a:lumOff val="40000"/>
+                </a:schemeClr>
+              </a:buClr>
+              <a:buFont typeface="Arial" panose="020B0604020202020204" pitchFamily="34" charset="0"/>
+              <a:buChar char="►"/>
+            </a:pPr>
+            <a:r>
+              <a:rPr lang="en-US" dirty="0"/>
+              <a:t> </a:t>
+            </a:r>
+            <a:r>
+              <a:rPr lang="de-DE" sz="2400" dirty="0">
+                <a:cs typeface="Calibri"/>
+              </a:rPr>
+              <a:t>Depth </a:t>
+            </a:r>
+            <a:r>
+              <a:rPr lang="de-DE" sz="2400" dirty="0" err="1">
+                <a:cs typeface="Calibri"/>
+              </a:rPr>
+              <a:t>of</a:t>
+            </a:r>
+            <a:r>
+              <a:rPr lang="de-DE" sz="2400" dirty="0">
+                <a:cs typeface="Calibri"/>
+              </a:rPr>
+              <a:t> </a:t>
+            </a:r>
+            <a:r>
+              <a:rPr lang="de-DE" sz="2400" dirty="0" err="1">
+                <a:cs typeface="Calibri"/>
+              </a:rPr>
+              <a:t>the</a:t>
+            </a:r>
+            <a:r>
+              <a:rPr lang="de-DE" sz="2400" dirty="0">
+                <a:cs typeface="Calibri"/>
+              </a:rPr>
+              <a:t> </a:t>
+            </a:r>
+            <a:r>
+              <a:rPr lang="de-DE" sz="2400" dirty="0" err="1">
+                <a:cs typeface="Calibri"/>
+              </a:rPr>
+              <a:t>tree</a:t>
+            </a:r>
+            <a:r>
+              <a:rPr lang="de-DE" sz="2400" dirty="0">
+                <a:cs typeface="Calibri"/>
+              </a:rPr>
+              <a:t>: 4</a:t>
+            </a:r>
+            <a:endParaRPr lang="en-US" b="1" dirty="0"/>
+          </a:p>
+          <a:p>
+            <a:pPr marL="742950" lvl="1" indent="-285750">
+              <a:buClr>
+                <a:schemeClr val="accent1">
+                  <a:lumMod val="60000"/>
+                  <a:lumOff val="40000"/>
+                </a:schemeClr>
+              </a:buClr>
+              <a:buFont typeface="Arial" panose="020B0604020202020204" pitchFamily="34" charset="0"/>
+              <a:buChar char="►"/>
+            </a:pPr>
+            <a:r>
+              <a:rPr lang="en-US" dirty="0"/>
+              <a:t> </a:t>
+            </a:r>
+            <a:r>
+              <a:rPr lang="de-DE" sz="2400" dirty="0" err="1">
+                <a:cs typeface="Calibri"/>
+              </a:rPr>
+              <a:t>Accuracy</a:t>
+            </a:r>
+            <a:r>
+              <a:rPr lang="de-DE" sz="2400" dirty="0">
+                <a:cs typeface="Calibri"/>
+              </a:rPr>
+              <a:t>: 52.95%</a:t>
+            </a:r>
+            <a:endParaRPr lang="de-DE" dirty="0">
+              <a:solidFill>
+                <a:srgbClr val="000000"/>
+              </a:solidFill>
+              <a:cs typeface="Calibri"/>
+            </a:endParaRPr>
+          </a:p>
+        </p:txBody>
+      </p:sp>
     </p:spTree>
     <p:extLst>
       <p:ext uri="{BB962C8B-B14F-4D97-AF65-F5344CB8AC3E}">
@@ -10109,9 +10292,14 @@
           </a:bodyPr>
           <a:lstStyle/>
           <a:p>
-            <a:pPr lvl="1">
-              <a:buFont typeface="Wingdings,Sans-Serif" panose="020B0604020202020204" pitchFamily="34" charset="0"/>
-              <a:buChar char="q"/>
+            <a:pPr marL="285750" indent="-285750">
+              <a:buClr>
+                <a:schemeClr val="accent1">
+                  <a:lumMod val="75000"/>
+                </a:schemeClr>
+              </a:buClr>
+              <a:buFont typeface="Arial" panose="020B0604020202020204" pitchFamily="34" charset="0"/>
+              <a:buChar char="▌"/>
             </a:pPr>
             <a:r>
               <a:rPr lang="de-DE" sz="2600" u="sng" dirty="0">
@@ -10141,280 +10329,314 @@
               </a:rPr>
               <a:t>Perceptron</a:t>
             </a:r>
-            <a:endParaRPr lang="de-DE" sz="2600" u="sng" dirty="0">
+            <a:endParaRPr lang="en-US" b="1" dirty="0"/>
+          </a:p>
+          <a:p>
+            <a:pPr marL="742950" lvl="1" indent="-285750">
+              <a:buClr>
+                <a:schemeClr val="accent1">
+                  <a:lumMod val="60000"/>
+                  <a:lumOff val="40000"/>
+                </a:schemeClr>
+              </a:buClr>
+              <a:buFont typeface="Arial" panose="020B0604020202020204" pitchFamily="34" charset="0"/>
+              <a:buChar char="►"/>
+            </a:pPr>
+            <a:r>
+              <a:rPr lang="en-US" dirty="0"/>
+              <a:t> </a:t>
+            </a:r>
+            <a:r>
+              <a:rPr lang="de-DE" sz="2400" dirty="0">
+                <a:ea typeface="+mn-lt"/>
+                <a:cs typeface="+mn-lt"/>
+              </a:rPr>
+              <a:t>Dataset: </a:t>
+            </a:r>
+            <a:r>
+              <a:rPr lang="de-DE" sz="2400" dirty="0">
+                <a:cs typeface="Calibri"/>
+              </a:rPr>
+              <a:t>First </a:t>
+            </a:r>
+            <a:r>
+              <a:rPr lang="de-DE" sz="2400" dirty="0" err="1">
+                <a:cs typeface="Calibri"/>
+              </a:rPr>
+              <a:t>sliding</a:t>
+            </a:r>
+            <a:r>
+              <a:rPr lang="de-DE" sz="2400" dirty="0">
+                <a:cs typeface="Calibri"/>
+              </a:rPr>
+              <a:t> </a:t>
+            </a:r>
+            <a:r>
+              <a:rPr lang="de-DE" sz="2400" dirty="0" err="1">
+                <a:cs typeface="Calibri"/>
+              </a:rPr>
+              <a:t>window</a:t>
+            </a:r>
+            <a:r>
+              <a:rPr lang="de-DE" sz="2400" dirty="0">
+                <a:cs typeface="Calibri"/>
+              </a:rPr>
+              <a:t> </a:t>
+            </a:r>
+            <a:r>
+              <a:rPr lang="de-DE" sz="2400" dirty="0" err="1">
+                <a:cs typeface="Calibri"/>
+              </a:rPr>
+              <a:t>option</a:t>
+            </a:r>
+            <a:r>
+              <a:rPr lang="de-DE" sz="2400" dirty="0">
+                <a:cs typeface="Calibri"/>
+              </a:rPr>
+              <a:t> (13 </a:t>
+            </a:r>
+            <a:r>
+              <a:rPr lang="de-DE" sz="2400" dirty="0" err="1">
+                <a:cs typeface="Calibri"/>
+              </a:rPr>
+              <a:t>features</a:t>
+            </a:r>
+            <a:r>
+              <a:rPr lang="de-DE" sz="2400" dirty="0">
+                <a:cs typeface="Calibri"/>
+              </a:rPr>
+              <a:t>)</a:t>
+            </a:r>
+            <a:endParaRPr lang="en-US" b="1" dirty="0"/>
+          </a:p>
+          <a:p>
+            <a:pPr marL="742950" lvl="1" indent="-285750">
+              <a:buClr>
+                <a:schemeClr val="accent1">
+                  <a:lumMod val="60000"/>
+                  <a:lumOff val="40000"/>
+                </a:schemeClr>
+              </a:buClr>
+              <a:buFont typeface="Arial" panose="020B0604020202020204" pitchFamily="34" charset="0"/>
+              <a:buChar char="►"/>
+            </a:pPr>
+            <a:r>
+              <a:rPr lang="en-US" dirty="0"/>
+              <a:t> </a:t>
+            </a:r>
+            <a:r>
+              <a:rPr lang="de-DE" sz="2400" dirty="0">
+                <a:ea typeface="+mn-lt"/>
+                <a:cs typeface="+mn-lt"/>
+              </a:rPr>
+              <a:t>Hidden </a:t>
+            </a:r>
+            <a:r>
+              <a:rPr lang="de-DE" sz="2400" dirty="0" err="1">
+                <a:ea typeface="+mn-lt"/>
+                <a:cs typeface="+mn-lt"/>
+              </a:rPr>
+              <a:t>layers</a:t>
+            </a:r>
+            <a:r>
+              <a:rPr lang="de-DE" sz="2400" dirty="0">
+                <a:ea typeface="+mn-lt"/>
+                <a:cs typeface="+mn-lt"/>
+              </a:rPr>
+              <a:t>: 2(52,32 </a:t>
+            </a:r>
+            <a:r>
+              <a:rPr lang="de-DE" sz="2400" dirty="0" err="1">
+                <a:ea typeface="+mn-lt"/>
+                <a:cs typeface="+mn-lt"/>
+              </a:rPr>
+              <a:t>neurons</a:t>
+            </a:r>
+            <a:r>
+              <a:rPr lang="de-DE" sz="2400" dirty="0">
+                <a:ea typeface="+mn-lt"/>
+                <a:cs typeface="+mn-lt"/>
+              </a:rPr>
+              <a:t>)</a:t>
+            </a:r>
+            <a:endParaRPr lang="en-US" b="1" dirty="0"/>
+          </a:p>
+          <a:p>
+            <a:pPr marL="742950" lvl="1" indent="-285750">
+              <a:buClr>
+                <a:schemeClr val="accent1">
+                  <a:lumMod val="60000"/>
+                  <a:lumOff val="40000"/>
+                </a:schemeClr>
+              </a:buClr>
+              <a:buFont typeface="Arial" panose="020B0604020202020204" pitchFamily="34" charset="0"/>
+              <a:buChar char="►"/>
+            </a:pPr>
+            <a:r>
+              <a:rPr lang="en-US" dirty="0"/>
+              <a:t> </a:t>
+            </a:r>
+            <a:r>
+              <a:rPr lang="de-DE" sz="2400" dirty="0">
+                <a:ea typeface="+mn-lt"/>
+                <a:cs typeface="+mn-lt"/>
+              </a:rPr>
+              <a:t>Output </a:t>
+            </a:r>
+            <a:r>
+              <a:rPr lang="de-DE" sz="2400" dirty="0" err="1">
+                <a:ea typeface="+mn-lt"/>
+                <a:cs typeface="+mn-lt"/>
+              </a:rPr>
+              <a:t>layer</a:t>
+            </a:r>
+            <a:r>
+              <a:rPr lang="de-DE" sz="2400" dirty="0">
+                <a:ea typeface="+mn-lt"/>
+                <a:cs typeface="+mn-lt"/>
+              </a:rPr>
+              <a:t>: 3 </a:t>
+            </a:r>
+            <a:r>
+              <a:rPr lang="de-DE" sz="2400" dirty="0" err="1">
+                <a:ea typeface="+mn-lt"/>
+                <a:cs typeface="+mn-lt"/>
+              </a:rPr>
+              <a:t>neurons</a:t>
+            </a:r>
+            <a:endParaRPr lang="en-US" b="1" dirty="0"/>
+          </a:p>
+          <a:p>
+            <a:pPr marL="742950" lvl="1" indent="-285750">
+              <a:buClr>
+                <a:schemeClr val="accent1">
+                  <a:lumMod val="60000"/>
+                  <a:lumOff val="40000"/>
+                </a:schemeClr>
+              </a:buClr>
+              <a:buFont typeface="Arial" panose="020B0604020202020204" pitchFamily="34" charset="0"/>
+              <a:buChar char="►"/>
+            </a:pPr>
+            <a:r>
+              <a:rPr lang="en-US" dirty="0"/>
+              <a:t> </a:t>
+            </a:r>
+            <a:r>
+              <a:rPr lang="de-DE" sz="2400" dirty="0" err="1">
+                <a:ea typeface="+mn-lt"/>
+                <a:cs typeface="+mn-lt"/>
+              </a:rPr>
+              <a:t>Activation</a:t>
+            </a:r>
+            <a:r>
+              <a:rPr lang="de-DE" sz="2400" dirty="0">
+                <a:ea typeface="+mn-lt"/>
+                <a:cs typeface="+mn-lt"/>
+              </a:rPr>
+              <a:t> </a:t>
+            </a:r>
+            <a:r>
+              <a:rPr lang="de-DE" sz="2400" dirty="0" err="1">
+                <a:ea typeface="+mn-lt"/>
+                <a:cs typeface="+mn-lt"/>
+              </a:rPr>
+              <a:t>functions</a:t>
+            </a:r>
+            <a:r>
+              <a:rPr lang="de-DE" sz="2400" dirty="0">
+                <a:ea typeface="+mn-lt"/>
+                <a:cs typeface="+mn-lt"/>
+              </a:rPr>
+              <a:t>: Sigmoid and </a:t>
+            </a:r>
+            <a:r>
+              <a:rPr lang="de-DE" sz="2400" dirty="0" err="1">
+                <a:ea typeface="+mn-lt"/>
+                <a:cs typeface="+mn-lt"/>
+              </a:rPr>
+              <a:t>softmax</a:t>
+            </a:r>
+            <a:endParaRPr lang="en-US" b="1" dirty="0"/>
+          </a:p>
+          <a:p>
+            <a:pPr marL="742950" lvl="1" indent="-285750">
+              <a:buClr>
+                <a:schemeClr val="accent1">
+                  <a:lumMod val="60000"/>
+                  <a:lumOff val="40000"/>
+                </a:schemeClr>
+              </a:buClr>
+              <a:buFont typeface="Arial" panose="020B0604020202020204" pitchFamily="34" charset="0"/>
+              <a:buChar char="►"/>
+            </a:pPr>
+            <a:r>
+              <a:rPr lang="en-US" dirty="0"/>
+              <a:t> </a:t>
+            </a:r>
+            <a:r>
+              <a:rPr lang="de-DE" sz="2400" dirty="0">
+                <a:ea typeface="+mn-lt"/>
+                <a:cs typeface="+mn-lt"/>
+              </a:rPr>
+              <a:t>Optimizer: </a:t>
+            </a:r>
+            <a:r>
+              <a:rPr lang="de-DE" sz="2400" dirty="0" err="1">
+                <a:ea typeface="+mn-lt"/>
+                <a:cs typeface="+mn-lt"/>
+              </a:rPr>
+              <a:t>Stochastic</a:t>
+            </a:r>
+            <a:r>
+              <a:rPr lang="de-DE" sz="2400" dirty="0">
+                <a:ea typeface="+mn-lt"/>
+                <a:cs typeface="+mn-lt"/>
+              </a:rPr>
+              <a:t> </a:t>
+            </a:r>
+            <a:r>
+              <a:rPr lang="de-DE" sz="2400" dirty="0" err="1">
+                <a:ea typeface="+mn-lt"/>
+                <a:cs typeface="+mn-lt"/>
+              </a:rPr>
+              <a:t>gradient</a:t>
+            </a:r>
+            <a:r>
+              <a:rPr lang="de-DE" sz="2400" dirty="0">
+                <a:ea typeface="+mn-lt"/>
+                <a:cs typeface="+mn-lt"/>
+              </a:rPr>
+              <a:t> </a:t>
+            </a:r>
+            <a:r>
+              <a:rPr lang="de-DE" sz="2400" dirty="0" err="1">
+                <a:ea typeface="+mn-lt"/>
+                <a:cs typeface="+mn-lt"/>
+              </a:rPr>
+              <a:t>descent</a:t>
+            </a:r>
+            <a:endParaRPr lang="de-DE" dirty="0">
               <a:ea typeface="+mn-lt"/>
               <a:cs typeface="+mn-lt"/>
             </a:endParaRPr>
           </a:p>
           <a:p>
-            <a:pPr lvl="2">
-              <a:buFont typeface="Wingdings,Sans-Serif" panose="020B0604020202020204" pitchFamily="34" charset="0"/>
-              <a:buChar char="ü"/>
+            <a:pPr marL="742950" lvl="1" indent="-285750">
+              <a:buClr>
+                <a:schemeClr val="accent1">
+                  <a:lumMod val="60000"/>
+                  <a:lumOff val="40000"/>
+                </a:schemeClr>
+              </a:buClr>
+              <a:buFont typeface="Arial" panose="020B0604020202020204" pitchFamily="34" charset="0"/>
+              <a:buChar char="►"/>
             </a:pPr>
             <a:r>
               <a:rPr lang="de-DE" sz="2400" dirty="0">
                 <a:ea typeface="+mn-lt"/>
                 <a:cs typeface="+mn-lt"/>
               </a:rPr>
-              <a:t> Dataset: </a:t>
-            </a:r>
-            <a:r>
-              <a:rPr lang="de-DE" sz="2400" dirty="0">
-                <a:cs typeface="Calibri"/>
-              </a:rPr>
-              <a:t>First </a:t>
-            </a:r>
-            <a:r>
-              <a:rPr lang="de-DE" sz="2400" dirty="0" err="1">
-                <a:cs typeface="Calibri"/>
-              </a:rPr>
-              <a:t>sliding</a:t>
-            </a:r>
-            <a:r>
-              <a:rPr lang="de-DE" sz="2400" dirty="0">
-                <a:cs typeface="Calibri"/>
-              </a:rPr>
               <a:t> </a:t>
-            </a:r>
-            <a:r>
-              <a:rPr lang="de-DE" sz="2400" dirty="0" err="1">
-                <a:cs typeface="Calibri"/>
-              </a:rPr>
-              <a:t>window</a:t>
-            </a:r>
-            <a:r>
-              <a:rPr lang="de-DE" sz="2400" dirty="0">
-                <a:cs typeface="Calibri"/>
-              </a:rPr>
-              <a:t> </a:t>
-            </a:r>
-            <a:r>
-              <a:rPr lang="de-DE" sz="2400" dirty="0" err="1">
-                <a:cs typeface="Calibri"/>
-              </a:rPr>
-              <a:t>option</a:t>
-            </a:r>
-            <a:r>
-              <a:rPr lang="de-DE" sz="2400" dirty="0">
-                <a:cs typeface="Calibri"/>
-              </a:rPr>
-              <a:t> (13 </a:t>
-            </a:r>
-            <a:r>
-              <a:rPr lang="de-DE" sz="2400" dirty="0" err="1">
-                <a:cs typeface="Calibri"/>
-              </a:rPr>
-              <a:t>features</a:t>
-            </a:r>
-            <a:r>
-              <a:rPr lang="de-DE" sz="2400" dirty="0">
-                <a:cs typeface="Calibri"/>
-              </a:rPr>
-              <a:t>)</a:t>
-            </a:r>
-            <a:endParaRPr lang="en-US" sz="2400" dirty="0">
-              <a:ea typeface="+mn-lt"/>
-              <a:cs typeface="+mn-lt"/>
-            </a:endParaRPr>
-          </a:p>
-          <a:p>
-            <a:pPr lvl="2">
-              <a:buFont typeface="Wingdings,Sans-Serif" panose="020B0604020202020204" pitchFamily="34" charset="0"/>
-              <a:buChar char="ü"/>
-            </a:pPr>
-            <a:r>
-              <a:rPr lang="de-DE" sz="2400" dirty="0">
-                <a:ea typeface="+mn-lt"/>
-                <a:cs typeface="+mn-lt"/>
-              </a:rPr>
-              <a:t> Hidden </a:t>
-            </a:r>
-            <a:r>
-              <a:rPr lang="de-DE" sz="2400" dirty="0" err="1">
-                <a:ea typeface="+mn-lt"/>
-                <a:cs typeface="+mn-lt"/>
-              </a:rPr>
-              <a:t>layers</a:t>
-            </a:r>
-            <a:r>
-              <a:rPr lang="de-DE" sz="2400" dirty="0">
-                <a:ea typeface="+mn-lt"/>
-                <a:cs typeface="+mn-lt"/>
-              </a:rPr>
-              <a:t>: 2(52,32 </a:t>
-            </a:r>
-            <a:r>
-              <a:rPr lang="de-DE" sz="2400" dirty="0" err="1">
-                <a:ea typeface="+mn-lt"/>
-                <a:cs typeface="+mn-lt"/>
-              </a:rPr>
-              <a:t>neurons</a:t>
-            </a:r>
-            <a:r>
-              <a:rPr lang="de-DE" sz="2400" dirty="0">
-                <a:ea typeface="+mn-lt"/>
-                <a:cs typeface="+mn-lt"/>
-              </a:rPr>
-              <a:t>)</a:t>
-            </a:r>
-            <a:endParaRPr lang="en-US" sz="2400" dirty="0">
-              <a:ea typeface="+mn-lt"/>
-              <a:cs typeface="+mn-lt"/>
-            </a:endParaRPr>
-          </a:p>
-          <a:p>
-            <a:pPr lvl="2">
-              <a:buFont typeface="Wingdings,Sans-Serif" panose="020B0604020202020204" pitchFamily="34" charset="0"/>
-              <a:buChar char="ü"/>
-            </a:pPr>
-            <a:r>
-              <a:rPr lang="de-DE" sz="2400" dirty="0">
-                <a:ea typeface="+mn-lt"/>
-                <a:cs typeface="+mn-lt"/>
-              </a:rPr>
-              <a:t> Output </a:t>
-            </a:r>
-            <a:r>
-              <a:rPr lang="de-DE" sz="2400" dirty="0" err="1">
-                <a:ea typeface="+mn-lt"/>
-                <a:cs typeface="+mn-lt"/>
-              </a:rPr>
-              <a:t>layer</a:t>
-            </a:r>
-            <a:r>
-              <a:rPr lang="de-DE" sz="2400" dirty="0">
-                <a:ea typeface="+mn-lt"/>
-                <a:cs typeface="+mn-lt"/>
-              </a:rPr>
-              <a:t>: 3 </a:t>
-            </a:r>
-            <a:r>
-              <a:rPr lang="de-DE" sz="2400" dirty="0" err="1">
-                <a:ea typeface="+mn-lt"/>
-                <a:cs typeface="+mn-lt"/>
-              </a:rPr>
-              <a:t>neurons</a:t>
-            </a:r>
-            <a:endParaRPr lang="de-DE" sz="2400" dirty="0">
-              <a:ea typeface="+mn-lt"/>
-              <a:cs typeface="+mn-lt"/>
-            </a:endParaRPr>
-          </a:p>
-          <a:p>
-            <a:pPr lvl="2">
-              <a:buFont typeface="Wingdings,Sans-Serif" panose="020B0604020202020204" pitchFamily="34" charset="0"/>
-              <a:buChar char="ü"/>
-            </a:pPr>
-            <a:r>
-              <a:rPr lang="de-DE" sz="2400" dirty="0">
-                <a:ea typeface="+mn-lt"/>
-                <a:cs typeface="+mn-lt"/>
-              </a:rPr>
-              <a:t> </a:t>
-            </a:r>
-            <a:r>
-              <a:rPr lang="de-DE" sz="2400" dirty="0" err="1">
-                <a:ea typeface="+mn-lt"/>
-                <a:cs typeface="+mn-lt"/>
-              </a:rPr>
-              <a:t>Activation</a:t>
-            </a:r>
-            <a:r>
-              <a:rPr lang="de-DE" sz="2400" dirty="0">
-                <a:ea typeface="+mn-lt"/>
-                <a:cs typeface="+mn-lt"/>
-              </a:rPr>
-              <a:t> </a:t>
-            </a:r>
-            <a:r>
-              <a:rPr lang="de-DE" sz="2400" dirty="0" err="1">
-                <a:ea typeface="+mn-lt"/>
-                <a:cs typeface="+mn-lt"/>
-              </a:rPr>
-              <a:t>functions</a:t>
-            </a:r>
-            <a:r>
-              <a:rPr lang="de-DE" sz="2400" dirty="0">
-                <a:ea typeface="+mn-lt"/>
-                <a:cs typeface="+mn-lt"/>
-              </a:rPr>
-              <a:t>: Sigmoid and </a:t>
-            </a:r>
-            <a:r>
-              <a:rPr lang="de-DE" sz="2400" dirty="0" err="1">
-                <a:ea typeface="+mn-lt"/>
-                <a:cs typeface="+mn-lt"/>
-              </a:rPr>
-              <a:t>softmax</a:t>
-            </a:r>
-            <a:endParaRPr lang="de-DE" sz="2400" dirty="0">
-              <a:ea typeface="+mn-lt"/>
-              <a:cs typeface="+mn-lt"/>
-            </a:endParaRPr>
-          </a:p>
-          <a:p>
-            <a:pPr lvl="2">
-              <a:buFont typeface="Wingdings,Sans-Serif" panose="020B0604020202020204" pitchFamily="34" charset="0"/>
-              <a:buChar char="ü"/>
-            </a:pPr>
-            <a:r>
-              <a:rPr lang="de-DE" sz="2400" dirty="0">
-                <a:ea typeface="+mn-lt"/>
-                <a:cs typeface="+mn-lt"/>
-              </a:rPr>
-              <a:t> Optimizer: </a:t>
-            </a:r>
-            <a:r>
-              <a:rPr lang="de-DE" sz="2400" dirty="0" err="1">
-                <a:ea typeface="+mn-lt"/>
-                <a:cs typeface="+mn-lt"/>
-              </a:rPr>
-              <a:t>Stochastic</a:t>
-            </a:r>
-            <a:r>
-              <a:rPr lang="de-DE" sz="2400" dirty="0">
-                <a:ea typeface="+mn-lt"/>
-                <a:cs typeface="+mn-lt"/>
-              </a:rPr>
-              <a:t> </a:t>
-            </a:r>
-            <a:r>
-              <a:rPr lang="de-DE" sz="2400" dirty="0" err="1">
-                <a:ea typeface="+mn-lt"/>
-                <a:cs typeface="+mn-lt"/>
-              </a:rPr>
-              <a:t>gradient</a:t>
-            </a:r>
-            <a:r>
-              <a:rPr lang="de-DE" sz="2400" dirty="0">
-                <a:ea typeface="+mn-lt"/>
-                <a:cs typeface="+mn-lt"/>
-              </a:rPr>
-              <a:t> </a:t>
-            </a:r>
-            <a:r>
-              <a:rPr lang="de-DE" sz="2400" dirty="0" err="1">
-                <a:ea typeface="+mn-lt"/>
-                <a:cs typeface="+mn-lt"/>
-              </a:rPr>
-              <a:t>descent</a:t>
-            </a:r>
-            <a:endParaRPr lang="de-DE" sz="2400" dirty="0">
-              <a:ea typeface="+mn-lt"/>
-              <a:cs typeface="+mn-lt"/>
-            </a:endParaRPr>
-          </a:p>
-          <a:p>
-            <a:pPr lvl="2">
-              <a:buFont typeface="Wingdings,Sans-Serif" panose="020B0604020202020204" pitchFamily="34" charset="0"/>
-              <a:buChar char="ü"/>
-            </a:pPr>
-            <a:r>
-              <a:rPr lang="de-DE" sz="2400" dirty="0">
-                <a:ea typeface="+mn-lt"/>
-                <a:cs typeface="+mn-lt"/>
-              </a:rPr>
-              <a:t> </a:t>
             </a:r>
             <a:r>
               <a:rPr lang="de-DE" sz="2400" dirty="0" err="1">
@@ -10554,7 +10776,7 @@
           <a:p>
             <a:fld id="{DBFD3584-5F40-43F0-92BE-0A3E03C5BD59}" type="datetime1">
               <a:rPr lang="de-DE" smtClean="0"/>
-              <a:t>08.07.2020</a:t>
+              <a:t>10.07.2020</a:t>
             </a:fld>
             <a:endParaRPr lang="de-DE"/>
           </a:p>
@@ -10729,15 +10951,20 @@
           </a:bodyPr>
           <a:lstStyle/>
           <a:p>
-            <a:pPr lvl="1">
-              <a:buFont typeface="Wingdings,Sans-Serif" panose="020B0604020202020204" pitchFamily="34" charset="0"/>
-              <a:buChar char="q"/>
+            <a:pPr marL="285750" indent="-285750">
+              <a:buClr>
+                <a:schemeClr val="accent1">
+                  <a:lumMod val="75000"/>
+                </a:schemeClr>
+              </a:buClr>
+              <a:buFont typeface="Arial" panose="020B0604020202020204" pitchFamily="34" charset="0"/>
+              <a:buChar char="▌"/>
             </a:pPr>
             <a:r>
               <a:rPr lang="de-DE" sz="2600" u="sng" dirty="0">
                 <a:cs typeface="Calibri"/>
               </a:rPr>
-              <a:t> Keras </a:t>
+              <a:t>Keras </a:t>
             </a:r>
             <a:r>
               <a:rPr lang="de-DE" sz="2600" u="sng" dirty="0" err="1">
@@ -10765,22 +10992,22 @@
               </a:rPr>
               <a:t> Network</a:t>
             </a:r>
-            <a:endParaRPr lang="en-US" sz="2600" u="sng" dirty="0">
-              <a:ea typeface="+mn-lt"/>
-              <a:cs typeface="+mn-lt"/>
-            </a:endParaRPr>
-          </a:p>
-          <a:p>
-            <a:pPr lvl="2">
-              <a:buFont typeface="Wingdings" panose="020B0604020202020204" pitchFamily="34" charset="0"/>
-              <a:buChar char="ü"/>
+            <a:endParaRPr lang="en-US" b="1" dirty="0"/>
+          </a:p>
+          <a:p>
+            <a:pPr marL="742950" lvl="1" indent="-285750">
+              <a:buClr>
+                <a:schemeClr val="accent1">
+                  <a:lumMod val="60000"/>
+                  <a:lumOff val="40000"/>
+                </a:schemeClr>
+              </a:buClr>
+              <a:buFont typeface="Arial" panose="020B0604020202020204" pitchFamily="34" charset="0"/>
+              <a:buChar char="►"/>
             </a:pPr>
             <a:r>
-              <a:rPr lang="de-DE" sz="2200" dirty="0">
-                <a:ea typeface="+mn-lt"/>
-                <a:cs typeface="+mn-lt"/>
-              </a:rPr>
-              <a:t> </a:t>
+              <a:rPr lang="en-US" dirty="0"/>
+              <a:t> </a:t>
             </a:r>
             <a:r>
               <a:rPr lang="de-DE" sz="2400" dirty="0">
@@ -10852,16 +11079,32 @@
               </a:rPr>
               <a:t>layers</a:t>
             </a:r>
-            <a:endParaRPr lang="de-DE" sz="2400" u="sng" dirty="0">
-              <a:ea typeface="+mn-lt"/>
-              <a:cs typeface="+mn-lt"/>
-            </a:endParaRPr>
-          </a:p>
-          <a:p>
-            <a:pPr lvl="2">
-              <a:buFont typeface="Wingdings" panose="020B0604020202020204" pitchFamily="34" charset="0"/>
-              <a:buChar char="ü"/>
+            <a:endParaRPr lang="en-US" b="1" dirty="0"/>
+          </a:p>
+          <a:p>
+            <a:pPr marL="742950" lvl="1" indent="-285750">
+              <a:buClr>
+                <a:schemeClr val="accent1">
+                  <a:lumMod val="60000"/>
+                  <a:lumOff val="40000"/>
+                </a:schemeClr>
+              </a:buClr>
+              <a:buFont typeface="Arial" panose="020B0604020202020204" pitchFamily="34" charset="0"/>
+              <a:buChar char="►"/>
             </a:pPr>
+            <a:r>
+              <a:rPr lang="en-US" dirty="0"/>
+              <a:t> </a:t>
+            </a:r>
+            <a:r>
+              <a:rPr lang="de-DE" sz="2400" dirty="0" err="1">
+                <a:solidFill>
+                  <a:srgbClr val="000000"/>
+                </a:solidFill>
+                <a:cs typeface="Calibri"/>
+              </a:rPr>
+              <a:t>Activation</a:t>
+            </a:r>
             <a:r>
               <a:rPr lang="de-DE" sz="2400" dirty="0">
                 <a:solidFill>
@@ -10869,7 +11112,7 @@
                 </a:solidFill>
                 <a:cs typeface="Calibri"/>
               </a:rPr>
-              <a:t> </a:t>
+              <a:t> </a:t>
             </a:r>
             <a:r>
               <a:rPr lang="de-DE" sz="2400" dirty="0" err="1">
@@ -10878,7 +11121,7 @@
                 </a:solidFill>
                 <a:cs typeface="Calibri"/>
               </a:rPr>
-              <a:t>Activation</a:t>
+              <a:t>functions</a:t>
             </a:r>
             <a:r>
               <a:rPr lang="de-DE" sz="2400" dirty="0">
@@ -10887,7 +11130,7 @@
                 </a:solidFill>
                 <a:cs typeface="Calibri"/>
               </a:rPr>
-              <a:t> </a:t>
+              <a:t>: </a:t>
             </a:r>
             <a:r>
               <a:rPr lang="de-DE" sz="2400" dirty="0" err="1">
@@ -10896,7 +11139,7 @@
                 </a:solidFill>
                 <a:cs typeface="Calibri"/>
               </a:rPr>
-              <a:t>functions</a:t>
+              <a:t>ReLU</a:t>
             </a:r>
             <a:r>
               <a:rPr lang="de-DE" sz="2400" dirty="0">
@@ -10905,7 +11148,7 @@
                 </a:solidFill>
                 <a:cs typeface="Calibri"/>
               </a:rPr>
-              <a:t>: </a:t>
+              <a:t> and </a:t>
             </a:r>
             <a:r>
               <a:rPr lang="de-DE" sz="2400" dirty="0" err="1">
@@ -10914,7 +11157,7 @@
                 </a:solidFill>
                 <a:cs typeface="Calibri"/>
               </a:rPr>
-              <a:t>ReLU</a:t>
+              <a:t>Softmax</a:t>
             </a:r>
             <a:r>
               <a:rPr lang="de-DE" sz="2400" dirty="0">
@@ -10923,7 +11166,7 @@
                 </a:solidFill>
                 <a:cs typeface="Calibri"/>
               </a:rPr>
-              <a:t> and </a:t>
+              <a:t>(last </a:t>
             </a:r>
             <a:r>
               <a:rPr lang="de-DE" sz="2400" dirty="0" err="1">
@@ -10932,7 +11175,7 @@
                 </a:solidFill>
                 <a:cs typeface="Calibri"/>
               </a:rPr>
-              <a:t>Softmax</a:t>
+              <a:t>layer</a:t>
             </a:r>
             <a:r>
               <a:rPr lang="de-DE" sz="2400" dirty="0">
@@ -10941,7 +11184,7 @@
                 </a:solidFill>
                 <a:cs typeface="Calibri"/>
               </a:rPr>
-              <a:t>(last </a:t>
+              <a:t>, multi-</a:t>
             </a:r>
             <a:r>
               <a:rPr lang="de-DE" sz="2400" dirty="0" err="1">
@@ -10950,7 +11193,7 @@
                 </a:solidFill>
                 <a:cs typeface="Calibri"/>
               </a:rPr>
-              <a:t>layer</a:t>
+              <a:t>class</a:t>
             </a:r>
             <a:r>
               <a:rPr lang="de-DE" sz="2400" dirty="0">
@@ -10959,7 +11202,7 @@
                 </a:solidFill>
                 <a:cs typeface="Calibri"/>
               </a:rPr>
-              <a:t>, multi-</a:t>
+              <a:t> </a:t>
             </a:r>
             <a:r>
               <a:rPr lang="de-DE" sz="2400" dirty="0" err="1">
@@ -10968,7 +11211,7 @@
                 </a:solidFill>
                 <a:cs typeface="Calibri"/>
               </a:rPr>
-              <a:t>class</a:t>
+              <a:t>classification</a:t>
             </a:r>
             <a:r>
               <a:rPr lang="de-DE" sz="2400" dirty="0">
@@ -10977,6 +11220,49 @@
                 </a:solidFill>
                 <a:cs typeface="Calibri"/>
               </a:rPr>
+              <a:t>)</a:t>
+            </a:r>
+            <a:endParaRPr lang="en-US" b="1" dirty="0"/>
+          </a:p>
+          <a:p>
+            <a:pPr marL="742950" lvl="1" indent="-285750">
+              <a:buClr>
+                <a:schemeClr val="accent1">
+                  <a:lumMod val="60000"/>
+                  <a:lumOff val="40000"/>
+                </a:schemeClr>
+              </a:buClr>
+              <a:buFont typeface="Arial" panose="020B0604020202020204" pitchFamily="34" charset="0"/>
+              <a:buChar char="►"/>
+            </a:pPr>
+            <a:r>
+              <a:rPr lang="en-US" dirty="0"/>
+              <a:t> </a:t>
+            </a:r>
+            <a:r>
+              <a:rPr lang="de-DE" sz="2400" dirty="0">
+                <a:solidFill>
+                  <a:srgbClr val="000000"/>
+                </a:solidFill>
+                <a:cs typeface="Calibri"/>
+              </a:rPr>
+              <a:t>Optimizer: Adam</a:t>
+            </a:r>
+            <a:endParaRPr lang="en-US" b="1" dirty="0"/>
+          </a:p>
+          <a:p>
+            <a:pPr marL="742950" lvl="1" indent="-285750">
+              <a:buClr>
+                <a:schemeClr val="accent1">
+                  <a:lumMod val="60000"/>
+                  <a:lumOff val="40000"/>
+                </a:schemeClr>
+              </a:buClr>
+              <a:buFont typeface="Arial" panose="020B0604020202020204" pitchFamily="34" charset="0"/>
+              <a:buChar char="►"/>
+            </a:pPr>
+            <a:r>
+              <a:rPr lang="en-US" dirty="0"/>
               <a:t> </a:t>
             </a:r>
             <a:r>
@@ -10986,7 +11272,7 @@
                 </a:solidFill>
                 <a:cs typeface="Calibri"/>
               </a:rPr>
-              <a:t>classification</a:t>
+              <a:t>Optimizations</a:t>
             </a:r>
             <a:r>
               <a:rPr lang="de-DE" sz="2400" dirty="0">
@@ -10995,14 +11281,17 @@
                 </a:solidFill>
                 <a:cs typeface="Calibri"/>
               </a:rPr>
-              <a:t>)</a:t>
-            </a:r>
-          </a:p>
-          <a:p>
-            <a:pPr lvl="2">
-              <a:buFont typeface="Wingdings" panose="020B0604020202020204" pitchFamily="34" charset="0"/>
-              <a:buChar char="ü"/>
-            </a:pPr>
+              <a:t>: Gradual </a:t>
+            </a:r>
+            <a:r>
+              <a:rPr lang="de-DE" sz="2400" dirty="0" err="1">
+                <a:solidFill>
+                  <a:srgbClr val="000000"/>
+                </a:solidFill>
+                <a:cs typeface="Calibri"/>
+              </a:rPr>
+              <a:t>reduction</a:t>
+            </a:r>
             <a:r>
               <a:rPr lang="de-DE" sz="2400" dirty="0">
                 <a:solidFill>
@@ -11010,14 +11299,17 @@
                 </a:solidFill>
                 <a:cs typeface="Calibri"/>
               </a:rPr>
-              <a:t> Optimizer: Adam</a:t>
-            </a:r>
-          </a:p>
-          <a:p>
-            <a:pPr lvl="2">
-              <a:buFont typeface="Wingdings" panose="020B0604020202020204" pitchFamily="34" charset="0"/>
-              <a:buChar char="ü"/>
-            </a:pPr>
+              <a:t> </a:t>
+            </a:r>
+            <a:r>
+              <a:rPr lang="de-DE" sz="2400" dirty="0" err="1">
+                <a:solidFill>
+                  <a:srgbClr val="000000"/>
+                </a:solidFill>
+                <a:cs typeface="Calibri"/>
+              </a:rPr>
+              <a:t>of</a:t>
+            </a:r>
             <a:r>
               <a:rPr lang="de-DE" sz="2400" dirty="0">
                 <a:solidFill>
@@ -11034,7 +11326,7 @@
                 </a:solidFill>
                 <a:cs typeface="Calibri"/>
               </a:rPr>
-              <a:t>Optimizations</a:t>
+              <a:t>learning</a:t>
             </a:r>
             <a:r>
               <a:rPr lang="de-DE" sz="2400" dirty="0">
@@ -11043,7 +11335,7 @@
                 </a:solidFill>
                 <a:cs typeface="Calibri"/>
               </a:rPr>
-              <a:t>: Gradual </a:t>
+              <a:t> rate, </a:t>
             </a:r>
             <a:r>
               <a:rPr lang="de-DE" sz="2400" dirty="0" err="1">
@@ -11052,7 +11344,7 @@
                 </a:solidFill>
                 <a:cs typeface="Calibri"/>
               </a:rPr>
-              <a:t>reduction</a:t>
+              <a:t>batch</a:t>
             </a:r>
             <a:r>
               <a:rPr lang="de-DE" sz="2400" dirty="0">
@@ -11070,7 +11362,7 @@
                 </a:solidFill>
                 <a:cs typeface="Calibri"/>
               </a:rPr>
-              <a:t>of</a:t>
+              <a:t>size</a:t>
             </a:r>
             <a:r>
               <a:rPr lang="de-DE" sz="2400" dirty="0">
@@ -11088,7 +11380,7 @@
                 </a:solidFill>
                 <a:cs typeface="Calibri"/>
               </a:rPr>
-              <a:t>learning</a:t>
+              <a:t>optimized</a:t>
             </a:r>
             <a:r>
               <a:rPr lang="de-DE" sz="2400" dirty="0">
@@ -11097,7 +11389,7 @@
                 </a:solidFill>
                 <a:cs typeface="Calibri"/>
               </a:rPr>
-              <a:t> rate, </a:t>
+              <a:t> </a:t>
             </a:r>
             <a:r>
               <a:rPr lang="de-DE" sz="2400" dirty="0" err="1">
@@ -11106,7 +11398,7 @@
                 </a:solidFill>
                 <a:cs typeface="Calibri"/>
               </a:rPr>
-              <a:t>batch</a:t>
+              <a:t>for</a:t>
             </a:r>
             <a:r>
               <a:rPr lang="de-DE" sz="2400" dirty="0">
@@ -11115,7 +11407,7 @@
                 </a:solidFill>
                 <a:cs typeface="Calibri"/>
               </a:rPr>
-              <a:t> </a:t>
+              <a:t> GPUs, </a:t>
             </a:r>
             <a:r>
               <a:rPr lang="de-DE" sz="2400" dirty="0" err="1">
@@ -11124,7 +11416,7 @@
                 </a:solidFill>
                 <a:cs typeface="Calibri"/>
               </a:rPr>
-              <a:t>size</a:t>
+              <a:t>patience</a:t>
             </a:r>
             <a:r>
               <a:rPr lang="de-DE" sz="2400" dirty="0">
@@ -11142,7 +11434,7 @@
                 </a:solidFill>
                 <a:cs typeface="Calibri"/>
               </a:rPr>
-              <a:t>optimized</a:t>
+              <a:t>of</a:t>
             </a:r>
             <a:r>
               <a:rPr lang="de-DE" sz="2400" dirty="0">
@@ -11151,7 +11443,7 @@
                 </a:solidFill>
                 <a:cs typeface="Calibri"/>
               </a:rPr>
-              <a:t> </a:t>
+              <a:t> 200 </a:t>
             </a:r>
             <a:r>
               <a:rPr lang="de-DE" sz="2400" dirty="0" err="1">
@@ -11160,7 +11452,24 @@
                 </a:solidFill>
                 <a:cs typeface="Calibri"/>
               </a:rPr>
-              <a:t>for</a:t>
+              <a:t>epochs</a:t>
+            </a:r>
+            <a:endParaRPr lang="en-US" b="1" dirty="0"/>
+          </a:p>
+          <a:p>
+            <a:pPr marL="742950" lvl="1" indent="-285750">
+              <a:buClr>
+                <a:schemeClr val="accent1">
+                  <a:lumMod val="60000"/>
+                  <a:lumOff val="40000"/>
+                </a:schemeClr>
+              </a:buClr>
+              <a:buFont typeface="Arial" panose="020B0604020202020204" pitchFamily="34" charset="0"/>
+              <a:buChar char="►"/>
+            </a:pPr>
+            <a:r>
+              <a:rPr lang="en-US" dirty="0"/>
+              <a:t> </a:t>
             </a:r>
             <a:r>
               <a:rPr lang="de-DE" sz="2400" dirty="0">
@@ -11169,7 +11478,7 @@
                 </a:solidFill>
                 <a:cs typeface="Calibri"/>
               </a:rPr>
-              <a:t> GPUs, </a:t>
+              <a:t>Loss </a:t>
             </a:r>
             <a:r>
               <a:rPr lang="de-DE" sz="2400" dirty="0" err="1">
@@ -11178,7 +11487,7 @@
                 </a:solidFill>
                 <a:cs typeface="Calibri"/>
               </a:rPr>
-              <a:t>patience</a:t>
+              <a:t>function</a:t>
             </a:r>
             <a:r>
               <a:rPr lang="de-DE" sz="2400" dirty="0">
@@ -11187,36 +11496,79 @@
                 </a:solidFill>
                 <a:cs typeface="Calibri"/>
               </a:rPr>
+              <a:t>: </a:t>
+            </a:r>
+            <a:r>
+              <a:rPr lang="de-DE" sz="2400" dirty="0" err="1">
+                <a:ea typeface="+mn-lt"/>
+                <a:cs typeface="+mn-lt"/>
+              </a:rPr>
+              <a:t>Sparse</a:t>
+            </a:r>
+            <a:r>
+              <a:rPr lang="de-DE" sz="2400" dirty="0">
+                <a:ea typeface="+mn-lt"/>
+                <a:cs typeface="+mn-lt"/>
+              </a:rPr>
               <a:t> </a:t>
             </a:r>
             <a:r>
               <a:rPr lang="de-DE" sz="2400" dirty="0" err="1">
-                <a:solidFill>
-                  <a:srgbClr val="000000"/>
-                </a:solidFill>
-                <a:cs typeface="Calibri"/>
-              </a:rPr>
-              <a:t>of</a:t>
+                <a:ea typeface="+mn-lt"/>
+                <a:cs typeface="+mn-lt"/>
+              </a:rPr>
+              <a:t>Categorical</a:t>
             </a:r>
             <a:r>
               <a:rPr lang="de-DE" sz="2400" dirty="0">
-                <a:solidFill>
-                  <a:srgbClr val="000000"/>
-                </a:solidFill>
-                <a:cs typeface="Calibri"/>
-              </a:rPr>
-              <a:t> 200 </a:t>
+                <a:ea typeface="+mn-lt"/>
+                <a:cs typeface="+mn-lt"/>
+              </a:rPr>
+              <a:t> </a:t>
             </a:r>
             <a:r>
               <a:rPr lang="de-DE" sz="2400" dirty="0" err="1">
-                <a:solidFill>
-                  <a:srgbClr val="000000"/>
-                </a:solidFill>
-                <a:cs typeface="Calibri"/>
-              </a:rPr>
-              <a:t>epochs</a:t>
-            </a:r>
-            <a:endParaRPr lang="de-DE" sz="2400" dirty="0">
+                <a:ea typeface="+mn-lt"/>
+                <a:cs typeface="+mn-lt"/>
+              </a:rPr>
+              <a:t>Crossentropy</a:t>
+            </a:r>
+            <a:r>
+              <a:rPr lang="de-DE" sz="2400" dirty="0">
+                <a:ea typeface="+mn-lt"/>
+                <a:cs typeface="+mn-lt"/>
+              </a:rPr>
+              <a:t> (due </a:t>
+            </a:r>
+            <a:r>
+              <a:rPr lang="de-DE" sz="2400" dirty="0" err="1">
+                <a:ea typeface="+mn-lt"/>
+                <a:cs typeface="+mn-lt"/>
+              </a:rPr>
+              <a:t>to</a:t>
+            </a:r>
+            <a:r>
+              <a:rPr lang="de-DE" sz="2400" dirty="0">
+                <a:ea typeface="+mn-lt"/>
+                <a:cs typeface="+mn-lt"/>
+              </a:rPr>
+              <a:t> </a:t>
+            </a:r>
+            <a:r>
+              <a:rPr lang="de-DE" sz="2400" dirty="0" err="1">
+                <a:ea typeface="+mn-lt"/>
+                <a:cs typeface="+mn-lt"/>
+              </a:rPr>
+              <a:t>class-encoding</a:t>
+            </a:r>
+            <a:r>
+              <a:rPr lang="de-DE" sz="2400" dirty="0">
+                <a:ea typeface="+mn-lt"/>
+                <a:cs typeface="+mn-lt"/>
+              </a:rPr>
+              <a:t>)</a:t>
+            </a:r>
+            <a:endParaRPr lang="de-DE" dirty="0">
               <a:solidFill>
                 <a:srgbClr val="000000"/>
               </a:solidFill>
@@ -11224,201 +11576,118 @@
             </a:endParaRPr>
           </a:p>
           <a:p>
-            <a:pPr lvl="2">
-              <a:buFont typeface="Wingdings" panose="020B0604020202020204" pitchFamily="34" charset="0"/>
-              <a:buChar char="ü"/>
+            <a:pPr marL="742950" lvl="1" indent="-285750">
+              <a:buClr>
+                <a:schemeClr val="accent1">
+                  <a:lumMod val="60000"/>
+                  <a:lumOff val="40000"/>
+                </a:schemeClr>
+              </a:buClr>
+              <a:buFont typeface="Arial" panose="020B0604020202020204" pitchFamily="34" charset="0"/>
+              <a:buChar char="►"/>
             </a:pPr>
             <a:r>
               <a:rPr lang="de-DE" sz="2400" dirty="0">
                 <a:solidFill>
                   <a:srgbClr val="000000"/>
                 </a:solidFill>
+                <a:ea typeface="+mn-lt"/>
                 <a:cs typeface="Calibri"/>
               </a:rPr>
-              <a:t> Loss </a:t>
+              <a:t> </a:t>
+            </a:r>
+            <a:r>
+              <a:rPr lang="en-US" sz="2400" dirty="0">
+                <a:ea typeface="+mn-lt"/>
+                <a:cs typeface="+mn-lt"/>
+              </a:rPr>
+              <a:t>Regularization techniques</a:t>
+            </a:r>
+            <a:r>
+              <a:rPr lang="de-DE" sz="2400" dirty="0">
+                <a:ea typeface="+mn-lt"/>
+                <a:cs typeface="+mn-lt"/>
+              </a:rPr>
+              <a:t>: </a:t>
             </a:r>
             <a:r>
               <a:rPr lang="de-DE" sz="2400" dirty="0" err="1">
-                <a:solidFill>
-                  <a:srgbClr val="000000"/>
-                </a:solidFill>
-                <a:cs typeface="Calibri"/>
-              </a:rPr>
-              <a:t>function</a:t>
-            </a:r>
+                <a:ea typeface="+mn-lt"/>
+                <a:cs typeface="+mn-lt"/>
+              </a:rPr>
+              <a:t>Weight</a:t>
+            </a:r>
+            <a:r>
+              <a:rPr lang="de-DE" sz="2400" dirty="0">
+                <a:ea typeface="+mn-lt"/>
+                <a:cs typeface="+mn-lt"/>
+              </a:rPr>
+              <a:t> </a:t>
+            </a:r>
+            <a:r>
+              <a:rPr lang="en-US" sz="2400" dirty="0">
+                <a:ea typeface="+mn-lt"/>
+                <a:cs typeface="+mn-lt"/>
+              </a:rPr>
+              <a:t>regularization (</a:t>
+            </a:r>
+            <a:r>
+              <a:rPr lang="de-DE" sz="2400" dirty="0">
+                <a:ea typeface="+mn-lt"/>
+                <a:cs typeface="+mn-lt"/>
+              </a:rPr>
+              <a:t>L2) and/</a:t>
+            </a:r>
+            <a:r>
+              <a:rPr lang="de-DE" sz="2400" dirty="0" err="1">
+                <a:ea typeface="+mn-lt"/>
+                <a:cs typeface="+mn-lt"/>
+              </a:rPr>
+              <a:t>or</a:t>
+            </a:r>
+            <a:r>
+              <a:rPr lang="de-DE" sz="2400" dirty="0">
+                <a:ea typeface="+mn-lt"/>
+                <a:cs typeface="+mn-lt"/>
+              </a:rPr>
+              <a:t> </a:t>
+            </a:r>
+            <a:r>
+              <a:rPr lang="de-DE" sz="2400" dirty="0" err="1">
+                <a:ea typeface="+mn-lt"/>
+                <a:cs typeface="+mn-lt"/>
+              </a:rPr>
+              <a:t>dropout</a:t>
+            </a:r>
+            <a:endParaRPr lang="de-DE" dirty="0">
+              <a:solidFill>
+                <a:srgbClr val="000000"/>
+              </a:solidFill>
+              <a:ea typeface="+mn-lt"/>
+              <a:cs typeface="Calibri"/>
+            </a:endParaRPr>
+          </a:p>
+          <a:p>
+            <a:pPr marL="742950" lvl="1" indent="-285750">
+              <a:buClr>
+                <a:schemeClr val="accent1">
+                  <a:lumMod val="60000"/>
+                  <a:lumOff val="40000"/>
+                </a:schemeClr>
+              </a:buClr>
+              <a:buFont typeface="Arial" panose="020B0604020202020204" pitchFamily="34" charset="0"/>
+              <a:buChar char="►"/>
+            </a:pPr>
             <a:r>
               <a:rPr lang="de-DE" sz="2400" dirty="0">
                 <a:solidFill>
                   <a:srgbClr val="000000"/>
                 </a:solidFill>
+                <a:ea typeface="+mn-lt"/>
                 <a:cs typeface="Calibri"/>
               </a:rPr>
-              <a:t>: </a:t>
-            </a:r>
-            <a:r>
-              <a:rPr lang="de-DE" sz="2400" dirty="0" err="1">
-                <a:ea typeface="+mn-lt"/>
-                <a:cs typeface="+mn-lt"/>
-              </a:rPr>
-              <a:t>Sparse</a:t>
-            </a:r>
-            <a:r>
-              <a:rPr lang="de-DE" sz="2400" dirty="0">
-                <a:ea typeface="+mn-lt"/>
-                <a:cs typeface="+mn-lt"/>
-              </a:rPr>
               <a:t> </a:t>
             </a:r>
-            <a:r>
-              <a:rPr lang="de-DE" sz="2400" dirty="0" err="1">
-                <a:ea typeface="+mn-lt"/>
-                <a:cs typeface="+mn-lt"/>
-              </a:rPr>
-              <a:t>Categorical</a:t>
-            </a:r>
-            <a:r>
-              <a:rPr lang="de-DE" sz="2400" dirty="0">
-                <a:ea typeface="+mn-lt"/>
-                <a:cs typeface="+mn-lt"/>
-              </a:rPr>
-              <a:t> </a:t>
-            </a:r>
-            <a:r>
-              <a:rPr lang="de-DE" sz="2400" dirty="0" err="1">
-                <a:ea typeface="+mn-lt"/>
-                <a:cs typeface="+mn-lt"/>
-              </a:rPr>
-              <a:t>Crossentropy</a:t>
-            </a:r>
-            <a:r>
-              <a:rPr lang="de-DE" sz="2400" dirty="0">
-                <a:ea typeface="+mn-lt"/>
-                <a:cs typeface="+mn-lt"/>
-              </a:rPr>
-              <a:t> (due </a:t>
-            </a:r>
-            <a:r>
-              <a:rPr lang="de-DE" sz="2400" dirty="0" err="1">
-                <a:ea typeface="+mn-lt"/>
-                <a:cs typeface="+mn-lt"/>
-              </a:rPr>
-              <a:t>to</a:t>
-            </a:r>
-            <a:r>
-              <a:rPr lang="de-DE" sz="2400" dirty="0">
-                <a:ea typeface="+mn-lt"/>
-                <a:cs typeface="+mn-lt"/>
-              </a:rPr>
-              <a:t> </a:t>
-            </a:r>
-            <a:r>
-              <a:rPr lang="de-DE" sz="2400" dirty="0" err="1">
-                <a:ea typeface="+mn-lt"/>
-                <a:cs typeface="+mn-lt"/>
-              </a:rPr>
-              <a:t>class-encoding</a:t>
-            </a:r>
-            <a:r>
-              <a:rPr lang="de-DE" sz="2400" dirty="0">
-                <a:ea typeface="+mn-lt"/>
-                <a:cs typeface="+mn-lt"/>
-              </a:rPr>
-              <a:t>)</a:t>
-            </a:r>
-            <a:endParaRPr lang="de-DE" sz="2400" dirty="0">
-              <a:solidFill>
-                <a:srgbClr val="000000"/>
-              </a:solidFill>
-              <a:cs typeface="Calibri"/>
-            </a:endParaRPr>
-          </a:p>
-          <a:p>
-            <a:pPr lvl="2">
-              <a:buFont typeface="Wingdings" panose="020B0604020202020204" pitchFamily="34" charset="0"/>
-              <a:buChar char="ü"/>
-            </a:pPr>
-            <a:r>
-              <a:rPr lang="de-DE" sz="2400" dirty="0">
-                <a:ea typeface="+mn-lt"/>
-                <a:cs typeface="+mn-lt"/>
-              </a:rPr>
-              <a:t> </a:t>
-            </a:r>
-            <a:r>
-              <a:rPr lang="en-US" sz="2400" dirty="0">
-                <a:ea typeface="+mn-lt"/>
-                <a:cs typeface="+mn-lt"/>
-              </a:rPr>
-              <a:t>Regularization techniques</a:t>
-            </a:r>
-            <a:r>
-              <a:rPr lang="de-DE" sz="2400" dirty="0">
-                <a:ea typeface="+mn-lt"/>
-                <a:cs typeface="+mn-lt"/>
-              </a:rPr>
-              <a:t>: </a:t>
-            </a:r>
-            <a:r>
-              <a:rPr lang="de-DE" sz="2400" dirty="0" err="1">
-                <a:ea typeface="+mn-lt"/>
-                <a:cs typeface="+mn-lt"/>
-              </a:rPr>
-              <a:t>Weight</a:t>
-            </a:r>
-            <a:r>
-              <a:rPr lang="de-DE" sz="2400" dirty="0">
-                <a:ea typeface="+mn-lt"/>
-                <a:cs typeface="+mn-lt"/>
-              </a:rPr>
-              <a:t> </a:t>
-            </a:r>
-            <a:r>
-              <a:rPr lang="en-US" sz="2400" dirty="0">
-                <a:ea typeface="+mn-lt"/>
-                <a:cs typeface="+mn-lt"/>
-              </a:rPr>
-              <a:t>regularization (</a:t>
-            </a:r>
-            <a:r>
-              <a:rPr lang="de-DE" sz="2400" dirty="0">
-                <a:ea typeface="+mn-lt"/>
-                <a:cs typeface="+mn-lt"/>
-              </a:rPr>
-              <a:t>L2) and/</a:t>
-            </a:r>
-            <a:r>
-              <a:rPr lang="de-DE" sz="2400" dirty="0" err="1">
-                <a:ea typeface="+mn-lt"/>
-                <a:cs typeface="+mn-lt"/>
-              </a:rPr>
-              <a:t>or</a:t>
-            </a:r>
-            <a:r>
-              <a:rPr lang="de-DE" sz="2400" dirty="0">
-                <a:ea typeface="+mn-lt"/>
-                <a:cs typeface="+mn-lt"/>
-              </a:rPr>
-              <a:t> </a:t>
-            </a:r>
-            <a:r>
-              <a:rPr lang="de-DE" sz="2400" dirty="0" err="1">
-                <a:ea typeface="+mn-lt"/>
-                <a:cs typeface="+mn-lt"/>
-              </a:rPr>
-              <a:t>dropout</a:t>
-            </a:r>
-            <a:endParaRPr lang="de-DE" sz="2400" dirty="0">
-              <a:solidFill>
-                <a:srgbClr val="000000"/>
-              </a:solidFill>
-              <a:cs typeface="Calibri"/>
-            </a:endParaRPr>
-          </a:p>
-          <a:p>
-            <a:pPr lvl="2">
-              <a:buFont typeface="Wingdings" panose="020B0604020202020204" pitchFamily="34" charset="0"/>
-              <a:buChar char="ü"/>
-            </a:pPr>
             <a:r>
               <a:rPr lang="de-DE" sz="2400" dirty="0" err="1">
                 <a:solidFill>
@@ -11602,7 +11871,7 @@
           <a:p>
             <a:fld id="{DFFCAE16-F0CB-428B-9963-DABAE8DE919E}" type="datetime1">
               <a:rPr lang="de-DE" smtClean="0"/>
-              <a:t>08.07.2020</a:t>
+              <a:t>10.07.2020</a:t>
             </a:fld>
             <a:endParaRPr lang="de-DE"/>
           </a:p>
@@ -11772,39 +12041,72 @@
           <a:bodyPr/>
           <a:lstStyle/>
           <a:p>
+            <a:pPr marL="285750" indent="-285750">
+              <a:buClr>
+                <a:schemeClr val="accent1">
+                  <a:lumMod val="75000"/>
+                </a:schemeClr>
+              </a:buClr>
+              <a:buFont typeface="Arial" panose="020B0604020202020204" pitchFamily="34" charset="0"/>
+              <a:buChar char="▌"/>
+            </a:pPr>
             <a:r>
               <a:rPr lang="en-US" sz="3200" dirty="0"/>
               <a:t>Improvements:</a:t>
             </a:r>
-          </a:p>
-          <a:p>
-            <a:pPr>
-              <a:buFont typeface="Wingdings" pitchFamily="2" charset="2"/>
-              <a:buChar char="Ø"/>
+            <a:endParaRPr lang="en-US" b="1" dirty="0"/>
+          </a:p>
+          <a:p>
+            <a:pPr marL="742950" lvl="1" indent="-285750">
+              <a:buClr>
+                <a:schemeClr val="accent1">
+                  <a:lumMod val="60000"/>
+                  <a:lumOff val="40000"/>
+                </a:schemeClr>
+              </a:buClr>
+              <a:buFont typeface="Arial" panose="020B0604020202020204" pitchFamily="34" charset="0"/>
+              <a:buChar char="►"/>
             </a:pPr>
             <a:r>
               <a:rPr lang="en-US" dirty="0"/>
-              <a:t>Better normalization</a:t>
-            </a:r>
-          </a:p>
-          <a:p>
-            <a:pPr>
-              <a:buFont typeface="Wingdings" pitchFamily="2" charset="2"/>
-              <a:buChar char="Ø"/>
+              <a:t> Better </a:t>
+            </a:r>
+            <a:r>
+              <a:rPr lang="en-US" dirty="0" err="1"/>
+              <a:t>normalizatiob</a:t>
+            </a:r>
+            <a:endParaRPr lang="en-US" dirty="0"/>
+          </a:p>
+          <a:p>
+            <a:pPr marL="742950" lvl="1" indent="-285750">
+              <a:buClr>
+                <a:schemeClr val="accent1">
+                  <a:lumMod val="60000"/>
+                  <a:lumOff val="40000"/>
+                </a:schemeClr>
+              </a:buClr>
+              <a:buFont typeface="Arial" panose="020B0604020202020204" pitchFamily="34" charset="0"/>
+              <a:buChar char="►"/>
             </a:pPr>
             <a:r>
               <a:rPr lang="en-US" dirty="0"/>
-              <a:t>No early step out</a:t>
-            </a:r>
-          </a:p>
-          <a:p>
-            <a:pPr>
-              <a:buFont typeface="Wingdings" pitchFamily="2" charset="2"/>
-              <a:buChar char="Ø"/>
+              <a:t> No early step out</a:t>
+            </a:r>
+          </a:p>
+          <a:p>
+            <a:pPr marL="742950" lvl="1" indent="-285750">
+              <a:buClr>
+                <a:schemeClr val="accent1">
+                  <a:lumMod val="60000"/>
+                  <a:lumOff val="40000"/>
+                </a:schemeClr>
+              </a:buClr>
+              <a:buFont typeface="Arial" panose="020B0604020202020204" pitchFamily="34" charset="0"/>
+              <a:buChar char="►"/>
             </a:pPr>
             <a:r>
               <a:rPr lang="en-US" dirty="0"/>
-              <a:t>Test accuracy: 51.14%</a:t>
+              <a:t> Test accuracy: 51.14%</a:t>
             </a:r>
           </a:p>
           <a:p>
@@ -11851,7 +12153,7 @@
           <a:p>
             <a:fld id="{BF0644D2-057E-4260-B66C-D62978A67776}" type="datetime1">
               <a:rPr lang="de-DE" smtClean="0"/>
-              <a:t>08.07.2020</a:t>
+              <a:t>10.07.2020</a:t>
             </a:fld>
             <a:endParaRPr lang="de-DE"/>
           </a:p>
@@ -12053,7 +12355,7 @@
           <a:p>
             <a:fld id="{2CA82912-125F-43FC-A872-07B5FFBA6423}" type="datetime1">
               <a:rPr lang="de-DE" smtClean="0"/>
-              <a:t>08.07.2020</a:t>
+              <a:t>10.07.2020</a:t>
             </a:fld>
             <a:endParaRPr lang="de-DE"/>
           </a:p>
@@ -12199,6 +12501,15 @@
           </a:bodyPr>
           <a:lstStyle/>
           <a:p>
+            <a:pPr marL="285750" indent="-285750">
+              <a:buClr>
+                <a:schemeClr val="accent1">
+                  <a:lumMod val="75000"/>
+                </a:schemeClr>
+              </a:buClr>
+              <a:buFont typeface="Arial" panose="020B0604020202020204" pitchFamily="34" charset="0"/>
+              <a:buChar char="▌"/>
+            </a:pPr>
             <a:r>
               <a:rPr lang="de-DE" dirty="0" err="1"/>
               <a:t>Predicting</a:t>
@@ -12366,7 +12677,7 @@
           <a:p>
             <a:fld id="{6E5E49ED-8A04-4300-BC21-606722A8E6EE}" type="datetime1">
               <a:rPr lang="de-DE" smtClean="0"/>
-              <a:t>08.07.2020</a:t>
+              <a:t>10.07.2020</a:t>
             </a:fld>
             <a:endParaRPr lang="de-DE"/>
           </a:p>
@@ -12553,7 +12864,7 @@
           <a:p>
             <a:fld id="{4B6C2BC7-A1AC-4F23-B303-50B5C0868CD1}" type="datetime1">
               <a:rPr lang="de-DE" smtClean="0"/>
-              <a:t>08.07.2020</a:t>
+              <a:t>10.07.2020</a:t>
             </a:fld>
             <a:endParaRPr lang="de-DE"/>
           </a:p>
@@ -13019,7 +13330,7 @@
           <a:p>
             <a:fld id="{7E9C6BE6-20A7-4DCE-898C-AFAAF2200B70}" type="datetime1">
               <a:rPr lang="de-DE" smtClean="0"/>
-              <a:t>08.07.2020</a:t>
+              <a:t>10.07.2020</a:t>
             </a:fld>
             <a:endParaRPr lang="de-DE"/>
           </a:p>
@@ -13302,7 +13613,7 @@
           <a:p>
             <a:fld id="{596E9DDF-1D90-4BD9-B937-2107135F8F05}" type="datetime1">
               <a:rPr lang="de-DE" smtClean="0"/>
-              <a:t>08.07.2020</a:t>
+              <a:t>10.07.2020</a:t>
             </a:fld>
             <a:endParaRPr lang="de-DE"/>
           </a:p>
@@ -14081,7 +14392,7 @@
           <a:p>
             <a:fld id="{9499F743-8BFE-416E-A488-F538D570F245}" type="datetime1">
               <a:rPr lang="de-DE" smtClean="0"/>
-              <a:t>08.07.2020</a:t>
+              <a:t>10.07.2020</a:t>
             </a:fld>
             <a:endParaRPr lang="de-DE"/>
           </a:p>
@@ -14793,7 +15104,7 @@
           <a:p>
             <a:fld id="{CE4801CE-F68B-4A9E-BD77-DA62B163CD77}" type="datetime1">
               <a:rPr lang="de-DE" smtClean="0"/>
-              <a:t>08.07.2020</a:t>
+              <a:t>10.07.2020</a:t>
             </a:fld>
             <a:endParaRPr lang="de-DE"/>
           </a:p>
@@ -14883,6 +15194,11 @@
               <a:alpha val="10196"/>
             </a:srgbClr>
           </a:solidFill>
+          <a:ln>
+            <a:solidFill>
+              <a:schemeClr val="tx1"/>
+            </a:solidFill>
+          </a:ln>
         </p:spPr>
         <p:style>
           <a:lnRef idx="2">
@@ -14960,7 +15276,7 @@
           <a:p>
             <a:fld id="{EDF96B14-A623-450A-9B64-7434B038D636}" type="datetime1">
               <a:rPr lang="de-DE" smtClean="0"/>
-              <a:t>08.07.2020</a:t>
+              <a:t>10.07.2020</a:t>
             </a:fld>
             <a:endParaRPr lang="de-DE"/>
           </a:p>
@@ -15049,6 +15365,11 @@
               <a:lumOff val="80000"/>
             </a:schemeClr>
           </a:solidFill>
+          <a:ln>
+            <a:solidFill>
+              <a:schemeClr val="tx1"/>
+            </a:solidFill>
+          </a:ln>
         </p:spPr>
         <p:style>
           <a:lnRef idx="2">
@@ -15112,6 +15433,11 @@
               <a:lumOff val="60000"/>
             </a:schemeClr>
           </a:solidFill>
+          <a:ln>
+            <a:solidFill>
+              <a:schemeClr val="tx1"/>
+            </a:solidFill>
+          </a:ln>
         </p:spPr>
         <p:style>
           <a:lnRef idx="2">
@@ -15176,6 +15502,11 @@
               <a:lumOff val="60000"/>
             </a:schemeClr>
           </a:solidFill>
+          <a:ln>
+            <a:solidFill>
+              <a:schemeClr val="tx1"/>
+            </a:solidFill>
+          </a:ln>
         </p:spPr>
         <p:style>
           <a:lnRef idx="2">
@@ -15240,6 +15571,11 @@
               <a:lumOff val="60000"/>
             </a:schemeClr>
           </a:solidFill>
+          <a:ln>
+            <a:solidFill>
+              <a:schemeClr val="tx1"/>
+            </a:solidFill>
+          </a:ln>
         </p:spPr>
         <p:style>
           <a:lnRef idx="2">
@@ -15304,6 +15640,11 @@
               <a:lumOff val="80000"/>
             </a:schemeClr>
           </a:solidFill>
+          <a:ln>
+            <a:solidFill>
+              <a:schemeClr val="tx1"/>
+            </a:solidFill>
+          </a:ln>
         </p:spPr>
         <p:style>
           <a:lnRef idx="2">
@@ -15368,6 +15709,11 @@
               <a:lumOff val="80000"/>
             </a:schemeClr>
           </a:solidFill>
+          <a:ln>
+            <a:solidFill>
+              <a:schemeClr val="tx1"/>
+            </a:solidFill>
+          </a:ln>
         </p:spPr>
         <p:style>
           <a:lnRef idx="2">
@@ -15431,6 +15777,11 @@
               <a:lumOff val="60000"/>
             </a:schemeClr>
           </a:solidFill>
+          <a:ln>
+            <a:solidFill>
+              <a:schemeClr val="tx1"/>
+            </a:solidFill>
+          </a:ln>
         </p:spPr>
         <p:style>
           <a:lnRef idx="2">
@@ -15495,6 +15846,11 @@
               <a:lumOff val="80000"/>
             </a:schemeClr>
           </a:solidFill>
+          <a:ln>
+            <a:solidFill>
+              <a:schemeClr val="tx1"/>
+            </a:solidFill>
+          </a:ln>
         </p:spPr>
         <p:style>
           <a:lnRef idx="2">
@@ -15559,6 +15915,11 @@
               <a:lumOff val="80000"/>
             </a:schemeClr>
           </a:solidFill>
+          <a:ln>
+            <a:solidFill>
+              <a:schemeClr val="tx1"/>
+            </a:solidFill>
+          </a:ln>
         </p:spPr>
         <p:style>
           <a:lnRef idx="2">
@@ -15622,6 +15983,11 @@
               <a:lumOff val="60000"/>
             </a:schemeClr>
           </a:solidFill>
+          <a:ln>
+            <a:solidFill>
+              <a:schemeClr val="tx1"/>
+            </a:solidFill>
+          </a:ln>
         </p:spPr>
         <p:style>
           <a:lnRef idx="2">
@@ -15683,6 +16049,11 @@
           <a:prstGeom prst="line">
             <a:avLst/>
           </a:prstGeom>
+          <a:ln>
+            <a:solidFill>
+              <a:schemeClr val="tx1"/>
+            </a:solidFill>
+          </a:ln>
         </p:spPr>
         <p:style>
           <a:lnRef idx="1">
@@ -15723,6 +16094,11 @@
           <a:prstGeom prst="line">
             <a:avLst/>
           </a:prstGeom>
+          <a:ln>
+            <a:solidFill>
+              <a:schemeClr val="tx1"/>
+            </a:solidFill>
+          </a:ln>
         </p:spPr>
         <p:style>
           <a:lnRef idx="1">
@@ -15763,6 +16139,11 @@
           <a:prstGeom prst="line">
             <a:avLst/>
           </a:prstGeom>
+          <a:ln>
+            <a:solidFill>
+              <a:schemeClr val="tx1"/>
+            </a:solidFill>
+          </a:ln>
         </p:spPr>
         <p:style>
           <a:lnRef idx="1">
@@ -15803,6 +16184,11 @@
           <a:prstGeom prst="line">
             <a:avLst/>
           </a:prstGeom>
+          <a:ln>
+            <a:solidFill>
+              <a:schemeClr val="tx1"/>
+            </a:solidFill>
+          </a:ln>
         </p:spPr>
         <p:style>
           <a:lnRef idx="1">
@@ -15843,6 +16229,11 @@
           <a:prstGeom prst="line">
             <a:avLst/>
           </a:prstGeom>
+          <a:ln>
+            <a:solidFill>
+              <a:schemeClr val="tx1"/>
+            </a:solidFill>
+          </a:ln>
         </p:spPr>
         <p:style>
           <a:lnRef idx="1">
@@ -15881,6 +16272,11 @@
           <a:prstGeom prst="line">
             <a:avLst/>
           </a:prstGeom>
+          <a:ln>
+            <a:solidFill>
+              <a:schemeClr val="tx1"/>
+            </a:solidFill>
+          </a:ln>
         </p:spPr>
         <p:style>
           <a:lnRef idx="1">
@@ -15923,6 +16319,11 @@
               <a:lumOff val="60000"/>
             </a:schemeClr>
           </a:solidFill>
+          <a:ln>
+            <a:solidFill>
+              <a:schemeClr val="tx1"/>
+            </a:solidFill>
+          </a:ln>
         </p:spPr>
         <p:style>
           <a:lnRef idx="2">
@@ -15973,18 +16374,23 @@
           <p:cNvCxnSpPr>
             <a:cxnSpLocks/>
             <a:stCxn id="25" idx="3"/>
-            <a:endCxn id="29" idx="1"/>
+            <a:endCxn id="10" idx="1"/>
           </p:cNvCxnSpPr>
           <p:nvPr/>
         </p:nvCxnSpPr>
         <p:spPr>
           <a:xfrm>
             <a:off x="1797630" y="3930264"/>
-            <a:ext cx="585375" cy="71"/>
+            <a:ext cx="781739" cy="8878"/>
           </a:xfrm>
           <a:prstGeom prst="line">
             <a:avLst/>
           </a:prstGeom>
+          <a:ln>
+            <a:solidFill>
+              <a:schemeClr val="tx1"/>
+            </a:solidFill>
+          </a:ln>
         </p:spPr>
         <p:style>
           <a:lnRef idx="1">
@@ -16022,6 +16428,11 @@
             <a:avLst/>
           </a:prstGeom>
           <a:noFill/>
+          <a:ln>
+            <a:solidFill>
+              <a:schemeClr val="tx1"/>
+            </a:solidFill>
+          </a:ln>
         </p:spPr>
         <p:txBody>
           <a:bodyPr wrap="square" rtlCol="0">
@@ -16126,7 +16537,7 @@
           <a:p>
             <a:fld id="{D3B4A22E-EFB2-4269-B19E-F96688142D44}" type="datetime1">
               <a:rPr lang="de-DE" smtClean="0"/>
-              <a:t>08.07.2020</a:t>
+              <a:t>10.07.2020</a:t>
             </a:fld>
             <a:endParaRPr lang="de-DE"/>
           </a:p>
@@ -16353,12 +16764,17 @@
         </p:blipFill>
         <p:spPr>
           <a:xfrm>
-            <a:off x="1330960" y="1659811"/>
+            <a:off x="1358900" y="1690688"/>
             <a:ext cx="9474200" cy="4642358"/>
           </a:xfrm>
           <a:prstGeom prst="rect">
             <a:avLst/>
           </a:prstGeom>
+          <a:ln>
+            <a:solidFill>
+              <a:schemeClr val="tx1"/>
+            </a:solidFill>
+          </a:ln>
         </p:spPr>
       </p:pic>
     </p:spTree>
@@ -16450,6 +16866,15 @@
           </a:bodyPr>
           <a:lstStyle/>
           <a:p>
+            <a:pPr marL="285750" indent="-285750">
+              <a:buClr>
+                <a:schemeClr val="accent1">
+                  <a:lumMod val="75000"/>
+                </a:schemeClr>
+              </a:buClr>
+              <a:buFont typeface="Arial" panose="020B0604020202020204" pitchFamily="34" charset="0"/>
+              <a:buChar char="▌"/>
+            </a:pPr>
             <a:r>
               <a:rPr lang="en-US" dirty="0"/>
               <a:t>GET /</a:t>
@@ -16458,10 +16883,19 @@
               <a:rPr lang="en-US" dirty="0" err="1"/>
               <a:t>soccerGamesClassification</a:t>
             </a:r>
-            <a:endParaRPr lang="en-US" dirty="0"/>
-          </a:p>
-          <a:p>
-            <a:pPr lvl="1"/>
+            <a:endParaRPr lang="en-US" b="1" dirty="0"/>
+          </a:p>
+          <a:p>
+            <a:pPr marL="742950" lvl="1" indent="-285750">
+              <a:buClr>
+                <a:schemeClr val="accent1">
+                  <a:lumMod val="60000"/>
+                  <a:lumOff val="40000"/>
+                </a:schemeClr>
+              </a:buClr>
+              <a:buFont typeface="Arial" panose="020B0604020202020204" pitchFamily="34" charset="0"/>
+              <a:buChar char="►"/>
+            </a:pPr>
             <a:r>
               <a:rPr lang="en-US" dirty="0"/>
               <a:t>Returns </a:t>
@@ -16484,6 +16918,15 @@
             </a:r>
           </a:p>
           <a:p>
+            <a:pPr marL="285750" indent="-285750">
+              <a:buClr>
+                <a:schemeClr val="accent1">
+                  <a:lumMod val="75000"/>
+                </a:schemeClr>
+              </a:buClr>
+              <a:buFont typeface="Arial" panose="020B0604020202020204" pitchFamily="34" charset="0"/>
+              <a:buChar char="▌"/>
+            </a:pPr>
             <a:r>
               <a:rPr lang="en-US" dirty="0"/>
               <a:t>GET /</a:t>
@@ -16492,10 +16935,19 @@
               <a:rPr lang="en-US" dirty="0" err="1"/>
               <a:t>soccerGamesRegression</a:t>
             </a:r>
-            <a:endParaRPr lang="en-US" dirty="0"/>
-          </a:p>
-          <a:p>
-            <a:pPr lvl="1"/>
+            <a:endParaRPr lang="en-US" b="1" dirty="0"/>
+          </a:p>
+          <a:p>
+            <a:pPr marL="742950" lvl="1" indent="-285750">
+              <a:buClr>
+                <a:schemeClr val="accent1">
+                  <a:lumMod val="60000"/>
+                  <a:lumOff val="40000"/>
+                </a:schemeClr>
+              </a:buClr>
+              <a:buFont typeface="Arial" panose="020B0604020202020204" pitchFamily="34" charset="0"/>
+              <a:buChar char="►"/>
+            </a:pPr>
             <a:r>
               <a:rPr lang="en-US" dirty="0"/>
               <a:t>Returns </a:t>
@@ -16510,6 +16962,15 @@
             </a:r>
           </a:p>
           <a:p>
+            <a:pPr marL="285750" indent="-285750">
+              <a:buClr>
+                <a:schemeClr val="accent1">
+                  <a:lumMod val="75000"/>
+                </a:schemeClr>
+              </a:buClr>
+              <a:buFont typeface="Arial" panose="020B0604020202020204" pitchFamily="34" charset="0"/>
+              <a:buChar char="▌"/>
+            </a:pPr>
             <a:r>
               <a:rPr lang="en-US" dirty="0"/>
               <a:t>GET /</a:t>
@@ -16518,30 +16979,68 @@
               <a:rPr lang="en-US" dirty="0" err="1"/>
               <a:t>retrainClassification</a:t>
             </a:r>
-            <a:endParaRPr lang="en-US" dirty="0"/>
-          </a:p>
-          <a:p>
-            <a:pPr lvl="1"/>
+            <a:endParaRPr lang="en-US" b="1" dirty="0"/>
+          </a:p>
+          <a:p>
+            <a:pPr marL="742950" lvl="1" indent="-285750">
+              <a:buClr>
+                <a:schemeClr val="accent1">
+                  <a:lumMod val="60000"/>
+                  <a:lumOff val="40000"/>
+                </a:schemeClr>
+              </a:buClr>
+              <a:buFont typeface="Arial" panose="020B0604020202020204" pitchFamily="34" charset="0"/>
+              <a:buChar char="►"/>
+            </a:pPr>
             <a:r>
               <a:rPr lang="en-US" dirty="0"/>
               <a:t>Backend retrains a new classification model</a:t>
             </a:r>
-          </a:p>
-          <a:p>
-            <a:pPr lvl="1"/>
+            <a:endParaRPr lang="en-US" b="1" dirty="0"/>
+          </a:p>
+          <a:p>
+            <a:pPr marL="742950" lvl="1" indent="-285750">
+              <a:buClr>
+                <a:schemeClr val="accent1">
+                  <a:lumMod val="60000"/>
+                  <a:lumOff val="40000"/>
+                </a:schemeClr>
+              </a:buClr>
+              <a:buFont typeface="Arial" panose="020B0604020202020204" pitchFamily="34" charset="0"/>
+              <a:buChar char="►"/>
+            </a:pPr>
             <a:r>
               <a:rPr lang="en-US" dirty="0"/>
               <a:t>Backend reruns new model on whole database</a:t>
             </a:r>
-          </a:p>
-          <a:p>
-            <a:pPr lvl="1"/>
+            <a:endParaRPr lang="en-US" b="1" dirty="0"/>
+          </a:p>
+          <a:p>
+            <a:pPr marL="742950" lvl="1" indent="-285750">
+              <a:buClr>
+                <a:schemeClr val="accent1">
+                  <a:lumMod val="60000"/>
+                  <a:lumOff val="40000"/>
+                </a:schemeClr>
+              </a:buClr>
+              <a:buFont typeface="Arial" panose="020B0604020202020204" pitchFamily="34" charset="0"/>
+              <a:buChar char="►"/>
+            </a:pPr>
             <a:r>
               <a:rPr lang="en-US" dirty="0"/>
               <a:t>Returns “ok”</a:t>
             </a:r>
           </a:p>
           <a:p>
+            <a:pPr marL="285750" indent="-285750">
+              <a:buClr>
+                <a:schemeClr val="accent1">
+                  <a:lumMod val="75000"/>
+                </a:schemeClr>
+              </a:buClr>
+              <a:buFont typeface="Arial" panose="020B0604020202020204" pitchFamily="34" charset="0"/>
+              <a:buChar char="▌"/>
+            </a:pPr>
             <a:r>
               <a:rPr lang="en-US" dirty="0"/>
               <a:t>GET /</a:t>
@@ -16550,30 +17049,68 @@
               <a:rPr lang="en-US" dirty="0" err="1"/>
               <a:t>retrainRegression</a:t>
             </a:r>
-            <a:endParaRPr lang="en-US" dirty="0"/>
-          </a:p>
-          <a:p>
-            <a:pPr lvl="1"/>
+            <a:endParaRPr lang="en-US" b="1" dirty="0"/>
+          </a:p>
+          <a:p>
+            <a:pPr marL="742950" lvl="1" indent="-285750">
+              <a:buClr>
+                <a:schemeClr val="accent1">
+                  <a:lumMod val="60000"/>
+                  <a:lumOff val="40000"/>
+                </a:schemeClr>
+              </a:buClr>
+              <a:buFont typeface="Arial" panose="020B0604020202020204" pitchFamily="34" charset="0"/>
+              <a:buChar char="►"/>
+            </a:pPr>
             <a:r>
               <a:rPr lang="en-US" dirty="0"/>
-              <a:t>Backend retrains a new regression model</a:t>
-            </a:r>
-          </a:p>
-          <a:p>
-            <a:pPr lvl="1"/>
+              <a:t> Backend retrains a new regression model</a:t>
+            </a:r>
+            <a:endParaRPr lang="en-US" b="1" dirty="0"/>
+          </a:p>
+          <a:p>
+            <a:pPr marL="742950" lvl="1" indent="-285750">
+              <a:buClr>
+                <a:schemeClr val="accent1">
+                  <a:lumMod val="60000"/>
+                  <a:lumOff val="40000"/>
+                </a:schemeClr>
+              </a:buClr>
+              <a:buFont typeface="Arial" panose="020B0604020202020204" pitchFamily="34" charset="0"/>
+              <a:buChar char="►"/>
+            </a:pPr>
             <a:r>
               <a:rPr lang="en-US" dirty="0"/>
               <a:t>Backend reruns new model on whole database</a:t>
             </a:r>
-          </a:p>
-          <a:p>
-            <a:pPr lvl="1"/>
+            <a:endParaRPr lang="en-US" b="1" dirty="0"/>
+          </a:p>
+          <a:p>
+            <a:pPr marL="742950" lvl="1" indent="-285750">
+              <a:buClr>
+                <a:schemeClr val="accent1">
+                  <a:lumMod val="60000"/>
+                  <a:lumOff val="40000"/>
+                </a:schemeClr>
+              </a:buClr>
+              <a:buFont typeface="Arial" panose="020B0604020202020204" pitchFamily="34" charset="0"/>
+              <a:buChar char="►"/>
+            </a:pPr>
             <a:r>
               <a:rPr lang="en-US" dirty="0"/>
               <a:t>Returns “ok”</a:t>
             </a:r>
           </a:p>
           <a:p>
+            <a:pPr marL="285750" indent="-285750">
+              <a:buClr>
+                <a:schemeClr val="accent1">
+                  <a:lumMod val="75000"/>
+                </a:schemeClr>
+              </a:buClr>
+              <a:buFont typeface="Arial" panose="020B0604020202020204" pitchFamily="34" charset="0"/>
+              <a:buChar char="▌"/>
+            </a:pPr>
             <a:r>
               <a:rPr lang="en-US" dirty="0"/>
               <a:t>GET /</a:t>
@@ -16582,10 +17119,19 @@
               <a:rPr lang="en-US" dirty="0" err="1"/>
               <a:t>fetchNewMatches</a:t>
             </a:r>
-            <a:endParaRPr lang="en-US" dirty="0"/>
-          </a:p>
-          <a:p>
-            <a:pPr lvl="1"/>
+            <a:endParaRPr lang="en-US" b="1" dirty="0"/>
+          </a:p>
+          <a:p>
+            <a:pPr marL="742950" lvl="1" indent="-285750">
+              <a:buClr>
+                <a:schemeClr val="accent1">
+                  <a:lumMod val="60000"/>
+                  <a:lumOff val="40000"/>
+                </a:schemeClr>
+              </a:buClr>
+              <a:buFont typeface="Arial" panose="020B0604020202020204" pitchFamily="34" charset="0"/>
+              <a:buChar char="►"/>
+            </a:pPr>
             <a:r>
               <a:rPr lang="en-US" dirty="0"/>
               <a:t>Backend fetches new matches from </a:t>
@@ -16594,10 +17140,19 @@
               <a:rPr lang="en-US" dirty="0" err="1"/>
               <a:t>datasources</a:t>
             </a:r>
-            <a:endParaRPr lang="en-US" dirty="0"/>
-          </a:p>
-          <a:p>
-            <a:pPr lvl="1"/>
+            <a:endParaRPr lang="en-US" b="1" dirty="0"/>
+          </a:p>
+          <a:p>
+            <a:pPr marL="742950" lvl="1" indent="-285750">
+              <a:buClr>
+                <a:schemeClr val="accent1">
+                  <a:lumMod val="60000"/>
+                  <a:lumOff val="40000"/>
+                </a:schemeClr>
+              </a:buClr>
+              <a:buFont typeface="Arial" panose="020B0604020202020204" pitchFamily="34" charset="0"/>
+              <a:buChar char="►"/>
+            </a:pPr>
             <a:r>
               <a:rPr lang="en-US" dirty="0"/>
               <a:t>Returns “ok”</a:t>
@@ -16629,7 +17184,7 @@
           <a:p>
             <a:fld id="{D3B4A22E-EFB2-4269-B19E-F96688142D44}" type="datetime1">
               <a:rPr lang="de-DE" smtClean="0"/>
-              <a:t>08.07.2020</a:t>
+              <a:t>10.07.2020</a:t>
             </a:fld>
             <a:endParaRPr lang="de-DE"/>
           </a:p>
@@ -16820,7 +17375,7 @@
           <a:p>
             <a:fld id="{233C9EE0-8D39-4357-A047-B642434D37AC}" type="datetime1">
               <a:rPr lang="de-DE" smtClean="0"/>
-              <a:t>08.07.2020</a:t>
+              <a:t>10.07.2020</a:t>
             </a:fld>
             <a:endParaRPr lang="de-DE"/>
           </a:p>
@@ -17075,6 +17630,15 @@
             </a:lvl9pPr>
           </a:lstStyle>
           <a:p>
+            <a:pPr marL="285750" indent="-285750">
+              <a:buClr>
+                <a:schemeClr val="accent1">
+                  <a:lumMod val="75000"/>
+                </a:schemeClr>
+              </a:buClr>
+              <a:buFont typeface="Arial" panose="020B0604020202020204" pitchFamily="34" charset="0"/>
+              <a:buChar char="▌"/>
+            </a:pPr>
             <a:r>
               <a:rPr lang="en-US" dirty="0">
                 <a:cs typeface="Calibri"/>
@@ -17083,6 +17647,15 @@
             </a:r>
           </a:p>
           <a:p>
+            <a:pPr marL="285750" indent="-285750">
+              <a:buClr>
+                <a:schemeClr val="accent1">
+                  <a:lumMod val="75000"/>
+                </a:schemeClr>
+              </a:buClr>
+              <a:buFont typeface="Arial" panose="020B0604020202020204" pitchFamily="34" charset="0"/>
+              <a:buChar char="▌"/>
+            </a:pPr>
             <a:r>
               <a:rPr lang="en-US" dirty="0">
                 <a:cs typeface="Calibri"/>
@@ -17091,6 +17664,15 @@
             </a:r>
           </a:p>
           <a:p>
+            <a:pPr marL="285750" indent="-285750">
+              <a:buClr>
+                <a:schemeClr val="accent1">
+                  <a:lumMod val="75000"/>
+                </a:schemeClr>
+              </a:buClr>
+              <a:buFont typeface="Arial" panose="020B0604020202020204" pitchFamily="34" charset="0"/>
+              <a:buChar char="▌"/>
+            </a:pPr>
             <a:r>
               <a:rPr lang="en-US" dirty="0">
                 <a:cs typeface="Calibri"/>
@@ -17099,6 +17681,15 @@
             </a:r>
           </a:p>
           <a:p>
+            <a:pPr marL="285750" indent="-285750">
+              <a:buClr>
+                <a:schemeClr val="accent1">
+                  <a:lumMod val="75000"/>
+                </a:schemeClr>
+              </a:buClr>
+              <a:buFont typeface="Arial" panose="020B0604020202020204" pitchFamily="34" charset="0"/>
+              <a:buChar char="▌"/>
+            </a:pPr>
             <a:r>
               <a:rPr lang="en-US" dirty="0">
                 <a:cs typeface="Calibri"/>
@@ -17201,6 +17792,15 @@
           </a:bodyPr>
           <a:lstStyle/>
           <a:p>
+            <a:pPr marL="285750" indent="-285750">
+              <a:buClr>
+                <a:schemeClr val="accent1">
+                  <a:lumMod val="75000"/>
+                </a:schemeClr>
+              </a:buClr>
+              <a:buFont typeface="Arial" panose="020B0604020202020204" pitchFamily="34" charset="0"/>
+              <a:buChar char="▌"/>
+            </a:pPr>
             <a:r>
               <a:rPr lang="en-US" dirty="0">
                 <a:cs typeface="Calibri"/>
@@ -17209,6 +17809,15 @@
             </a:r>
           </a:p>
           <a:p>
+            <a:pPr marL="285750" indent="-285750">
+              <a:buClr>
+                <a:schemeClr val="accent1">
+                  <a:lumMod val="75000"/>
+                </a:schemeClr>
+              </a:buClr>
+              <a:buFont typeface="Arial" panose="020B0604020202020204" pitchFamily="34" charset="0"/>
+              <a:buChar char="▌"/>
+            </a:pPr>
             <a:r>
               <a:rPr lang="en-US" dirty="0">
                 <a:cs typeface="Calibri"/>
@@ -17217,6 +17826,15 @@
             </a:r>
           </a:p>
           <a:p>
+            <a:pPr marL="285750" indent="-285750">
+              <a:buClr>
+                <a:schemeClr val="accent1">
+                  <a:lumMod val="75000"/>
+                </a:schemeClr>
+              </a:buClr>
+              <a:buFont typeface="Arial" panose="020B0604020202020204" pitchFamily="34" charset="0"/>
+              <a:buChar char="▌"/>
+            </a:pPr>
             <a:r>
               <a:rPr lang="en-US" dirty="0">
                 <a:cs typeface="Calibri"/>
@@ -17225,6 +17843,15 @@
             </a:r>
           </a:p>
           <a:p>
+            <a:pPr marL="285750" indent="-285750">
+              <a:buClr>
+                <a:schemeClr val="accent1">
+                  <a:lumMod val="75000"/>
+                </a:schemeClr>
+              </a:buClr>
+              <a:buFont typeface="Arial" panose="020B0604020202020204" pitchFamily="34" charset="0"/>
+              <a:buChar char="▌"/>
+            </a:pPr>
             <a:r>
               <a:rPr lang="en-US" dirty="0">
                 <a:cs typeface="Calibri"/>
@@ -17233,6 +17860,15 @@
             </a:r>
           </a:p>
           <a:p>
+            <a:pPr marL="285750" indent="-285750">
+              <a:buClr>
+                <a:schemeClr val="accent1">
+                  <a:lumMod val="75000"/>
+                </a:schemeClr>
+              </a:buClr>
+              <a:buFont typeface="Arial" panose="020B0604020202020204" pitchFamily="34" charset="0"/>
+              <a:buChar char="▌"/>
+            </a:pPr>
             <a:r>
               <a:rPr lang="en-US" dirty="0">
                 <a:cs typeface="Calibri"/>
@@ -17285,7 +17921,7 @@
           <a:p>
             <a:fld id="{6D2DF944-3ADE-4B60-BC56-9F44F2858CA9}" type="datetime1">
               <a:rPr lang="de-DE" smtClean="0"/>
-              <a:t>08.07.2020</a:t>
+              <a:t>10.07.2020</a:t>
             </a:fld>
             <a:endParaRPr lang="de-DE"/>
           </a:p>
@@ -17432,6 +18068,15 @@
           </a:bodyPr>
           <a:lstStyle/>
           <a:p>
+            <a:pPr marL="285750" indent="-285750">
+              <a:buClr>
+                <a:schemeClr val="accent1">
+                  <a:lumMod val="75000"/>
+                </a:schemeClr>
+              </a:buClr>
+              <a:buFont typeface="Arial" panose="020B0604020202020204" pitchFamily="34" charset="0"/>
+              <a:buChar char="▌"/>
+            </a:pPr>
             <a:r>
               <a:rPr lang="en-US" dirty="0">
                 <a:cs typeface="Calibri"/>
@@ -17440,6 +18085,15 @@
             </a:r>
           </a:p>
           <a:p>
+            <a:pPr marL="285750" indent="-285750">
+              <a:buClr>
+                <a:schemeClr val="accent1">
+                  <a:lumMod val="75000"/>
+                </a:schemeClr>
+              </a:buClr>
+              <a:buFont typeface="Arial" panose="020B0604020202020204" pitchFamily="34" charset="0"/>
+              <a:buChar char="▌"/>
+            </a:pPr>
             <a:r>
               <a:rPr lang="en-US" dirty="0">
                 <a:cs typeface="Calibri"/>
@@ -17448,6 +18102,15 @@
             </a:r>
           </a:p>
           <a:p>
+            <a:pPr marL="285750" indent="-285750">
+              <a:buClr>
+                <a:schemeClr val="accent1">
+                  <a:lumMod val="75000"/>
+                </a:schemeClr>
+              </a:buClr>
+              <a:buFont typeface="Arial" panose="020B0604020202020204" pitchFamily="34" charset="0"/>
+              <a:buChar char="▌"/>
+            </a:pPr>
             <a:r>
               <a:rPr lang="en-US" dirty="0">
                 <a:cs typeface="Calibri"/>
@@ -17456,6 +18119,15 @@
             </a:r>
           </a:p>
           <a:p>
+            <a:pPr marL="285750" indent="-285750">
+              <a:buClr>
+                <a:schemeClr val="accent1">
+                  <a:lumMod val="75000"/>
+                </a:schemeClr>
+              </a:buClr>
+              <a:buFont typeface="Arial" panose="020B0604020202020204" pitchFamily="34" charset="0"/>
+              <a:buChar char="▌"/>
+            </a:pPr>
             <a:r>
               <a:rPr lang="en-US" dirty="0">
                 <a:cs typeface="Calibri"/>
@@ -17464,6 +18136,15 @@
             </a:r>
           </a:p>
           <a:p>
+            <a:pPr marL="285750" indent="-285750">
+              <a:buClr>
+                <a:schemeClr val="accent1">
+                  <a:lumMod val="75000"/>
+                </a:schemeClr>
+              </a:buClr>
+              <a:buFont typeface="Arial" panose="020B0604020202020204" pitchFamily="34" charset="0"/>
+              <a:buChar char="▌"/>
+            </a:pPr>
             <a:r>
               <a:rPr lang="en-US" dirty="0">
                 <a:cs typeface="Calibri"/>
@@ -17472,6 +18153,15 @@
             </a:r>
           </a:p>
           <a:p>
+            <a:pPr marL="285750" indent="-285750">
+              <a:buClr>
+                <a:schemeClr val="accent1">
+                  <a:lumMod val="75000"/>
+                </a:schemeClr>
+              </a:buClr>
+              <a:buFont typeface="Arial" panose="020B0604020202020204" pitchFamily="34" charset="0"/>
+              <a:buChar char="▌"/>
+            </a:pPr>
             <a:r>
               <a:rPr lang="en-US" dirty="0">
                 <a:cs typeface="Calibri"/>
@@ -17480,6 +18170,15 @@
             </a:r>
           </a:p>
           <a:p>
+            <a:pPr marL="285750" indent="-285750">
+              <a:buClr>
+                <a:schemeClr val="accent1">
+                  <a:lumMod val="75000"/>
+                </a:schemeClr>
+              </a:buClr>
+              <a:buFont typeface="Arial" panose="020B0604020202020204" pitchFamily="34" charset="0"/>
+              <a:buChar char="▌"/>
+            </a:pPr>
             <a:r>
               <a:rPr lang="en-US" dirty="0">
                 <a:cs typeface="Calibri"/>
@@ -17517,7 +18216,7 @@
           <a:p>
             <a:fld id="{5130B58D-2B6C-443E-B36A-2B519790863E}" type="datetime1">
               <a:rPr lang="de-DE" smtClean="0"/>
-              <a:t>08.07.2020</a:t>
+              <a:t>10.07.2020</a:t>
             </a:fld>
             <a:endParaRPr lang="de-DE"/>
           </a:p>
@@ -17727,7 +18426,7 @@
           <a:p>
             <a:fld id="{FC21E6BC-48F8-4776-9F64-24FB2EF6738F}" type="datetime1">
               <a:rPr lang="de-DE" smtClean="0"/>
-              <a:t>08.07.2020</a:t>
+              <a:t>10.07.2020</a:t>
             </a:fld>
             <a:endParaRPr lang="de-DE" dirty="0"/>
           </a:p>
@@ -17884,7 +18583,7 @@
         </p:blipFill>
         <p:spPr>
           <a:xfrm>
-            <a:off x="5029200" y="144218"/>
+            <a:off x="5029200" y="134791"/>
             <a:ext cx="5605126" cy="6212132"/>
           </a:xfrm>
         </p:spPr>
@@ -17912,7 +18611,7 @@
           <a:p>
             <a:fld id="{ABD4FFFE-BDA5-4C6D-818F-AC63415EF76E}" type="datetime1">
               <a:rPr lang="de-DE" smtClean="0"/>
-              <a:t>08.07.2020</a:t>
+              <a:t>10.07.2020</a:t>
             </a:fld>
             <a:endParaRPr lang="de-DE"/>
           </a:p>
@@ -18061,7 +18760,7 @@
           <a:p>
             <a:fld id="{2FD63A82-654A-43A1-BAA7-24963EF8A3A2}" type="datetime1">
               <a:rPr lang="de-DE" smtClean="0"/>
-              <a:t>08.07.2020</a:t>
+              <a:t>10.07.2020</a:t>
             </a:fld>
             <a:endParaRPr lang="de-DE"/>
           </a:p>
@@ -18295,7 +18994,7 @@
           <a:p>
             <a:fld id="{130A0F16-7F19-4F54-A379-46DDC64559F7}" type="datetime1">
               <a:rPr lang="de-DE" smtClean="0"/>
-              <a:t>08.07.2020</a:t>
+              <a:t>10.07.2020</a:t>
             </a:fld>
             <a:endParaRPr lang="de-DE"/>
           </a:p>
@@ -18541,7 +19240,7 @@
           <a:p>
             <a:fld id="{2D46D04C-DC23-4E80-BD61-66B3B72FB21B}" type="datetime1">
               <a:rPr lang="de-DE" smtClean="0"/>
-              <a:t>08.07.2020</a:t>
+              <a:t>10.07.2020</a:t>
             </a:fld>
             <a:endParaRPr lang="de-DE"/>
           </a:p>
@@ -18751,7 +19450,7 @@
           <a:p>
             <a:fld id="{3310BFC6-DDC1-4279-8EE1-4ECAD53CE75B}" type="datetime1">
               <a:rPr lang="de-DE" smtClean="0"/>
-              <a:t>08.07.2020</a:t>
+              <a:t>10.07.2020</a:t>
             </a:fld>
             <a:endParaRPr lang="de-DE"/>
           </a:p>
@@ -18961,7 +19660,7 @@
           <a:p>
             <a:fld id="{7655E4B9-D977-42D8-9C94-D401F46191AA}" type="datetime1">
               <a:rPr lang="de-DE" smtClean="0"/>
-              <a:t>08.07.2020</a:t>
+              <a:t>10.07.2020</a:t>
             </a:fld>
             <a:endParaRPr lang="de-DE"/>
           </a:p>

</xml_diff>